<commit_message>
Update codes for week3 and changed files' names in week2
</commit_message>
<xml_diff>
--- a/DISP/DISP_2.pptx
+++ b/DISP/DISP_2.pptx
@@ -237,7 +237,7 @@
           <a:p>
             <a:fld id="{FEC78193-D98D-4EEC-A8B7-3F1FB340E8A2}" type="datetimeFigureOut">
               <a:rPr lang="zh-TW" altLang="en-US" smtClean="0"/>
-              <a:t>2023/9/20</a:t>
+              <a:t>2024/11/3</a:t>
             </a:fld>
             <a:endParaRPr lang="zh-TW" altLang="en-US"/>
           </a:p>
@@ -1298,7 +1298,7 @@
           <a:p>
             <a:fld id="{900F728B-0A0C-4D67-8B64-53A613CF05AE}" type="datetime1">
               <a:rPr lang="zh-TW" altLang="en-US" smtClean="0"/>
-              <a:t>2023/9/20</a:t>
+              <a:t>2024/11/3</a:t>
             </a:fld>
             <a:endParaRPr lang="zh-TW" altLang="en-US"/>
           </a:p>
@@ -1482,7 +1482,7 @@
           <a:p>
             <a:fld id="{43E20A2B-8FA0-4D28-A859-D16F604CB4FE}" type="datetime1">
               <a:rPr lang="zh-TW" altLang="en-US" smtClean="0"/>
-              <a:t>2023/9/20</a:t>
+              <a:t>2024/11/3</a:t>
             </a:fld>
             <a:endParaRPr lang="zh-TW" altLang="en-US"/>
           </a:p>
@@ -1660,7 +1660,7 @@
           <a:p>
             <a:fld id="{796C7306-4FB1-416B-9853-7E5879C2C549}" type="datetime1">
               <a:rPr lang="zh-TW" altLang="en-US" smtClean="0"/>
-              <a:t>2023/9/20</a:t>
+              <a:t>2024/11/3</a:t>
             </a:fld>
             <a:endParaRPr lang="zh-TW" altLang="en-US"/>
           </a:p>
@@ -1828,7 +1828,7 @@
           <a:p>
             <a:fld id="{10124402-B547-4681-97F8-343579DC4A3E}" type="datetime1">
               <a:rPr lang="zh-TW" altLang="en-US" smtClean="0"/>
-              <a:t>2023/9/20</a:t>
+              <a:t>2024/11/3</a:t>
             </a:fld>
             <a:endParaRPr lang="zh-TW" altLang="en-US"/>
           </a:p>
@@ -2089,7 +2089,7 @@
           <a:p>
             <a:fld id="{09D846B7-515C-484F-A06A-DCDC8984E652}" type="datetime1">
               <a:rPr lang="zh-TW" altLang="en-US" smtClean="0"/>
-              <a:t>2023/9/20</a:t>
+              <a:t>2024/11/3</a:t>
             </a:fld>
             <a:endParaRPr lang="zh-TW" altLang="en-US"/>
           </a:p>
@@ -2318,7 +2318,7 @@
           <a:p>
             <a:fld id="{2E2D83CA-A303-43FE-9BEF-0054A5063BBE}" type="datetime1">
               <a:rPr lang="zh-TW" altLang="en-US" smtClean="0"/>
-              <a:t>2023/9/20</a:t>
+              <a:t>2024/11/3</a:t>
             </a:fld>
             <a:endParaRPr lang="zh-TW" altLang="en-US"/>
           </a:p>
@@ -2682,7 +2682,7 @@
           <a:p>
             <a:fld id="{77DA8A4A-7EC0-45AD-B21E-E82FEA4FC834}" type="datetime1">
               <a:rPr lang="zh-TW" altLang="en-US" smtClean="0"/>
-              <a:t>2023/9/20</a:t>
+              <a:t>2024/11/3</a:t>
             </a:fld>
             <a:endParaRPr lang="zh-TW" altLang="en-US"/>
           </a:p>
@@ -2799,7 +2799,7 @@
           <a:p>
             <a:fld id="{186B930A-0A25-47FF-BED2-C7B1811AFEDB}" type="datetime1">
               <a:rPr lang="zh-TW" altLang="en-US" smtClean="0"/>
-              <a:t>2023/9/20</a:t>
+              <a:t>2024/11/3</a:t>
             </a:fld>
             <a:endParaRPr lang="zh-TW" altLang="en-US"/>
           </a:p>
@@ -2894,7 +2894,7 @@
           <a:p>
             <a:fld id="{4F434F9D-DCB4-4AE4-99DB-DE228BA6CC21}" type="datetime1">
               <a:rPr lang="zh-TW" altLang="en-US" smtClean="0"/>
-              <a:t>2023/9/20</a:t>
+              <a:t>2024/11/3</a:t>
             </a:fld>
             <a:endParaRPr lang="zh-TW" altLang="en-US"/>
           </a:p>
@@ -3185,7 +3185,7 @@
           <a:p>
             <a:fld id="{99148BD1-AF4F-4F52-A349-A75454F30DFC}" type="datetime1">
               <a:rPr lang="zh-TW" altLang="en-US" smtClean="0"/>
-              <a:t>2023/9/20</a:t>
+              <a:t>2024/11/3</a:t>
             </a:fld>
             <a:endParaRPr lang="zh-TW" altLang="en-US"/>
           </a:p>
@@ -3437,7 +3437,7 @@
           <a:p>
             <a:fld id="{2C07C3EB-A165-4413-84CB-E9CE571444F0}" type="datetime1">
               <a:rPr lang="zh-TW" altLang="en-US" smtClean="0"/>
-              <a:t>2023/9/20</a:t>
+              <a:t>2024/11/3</a:t>
             </a:fld>
             <a:endParaRPr lang="zh-TW" altLang="en-US"/>
           </a:p>
@@ -3648,7 +3648,7 @@
           <a:p>
             <a:fld id="{072DC92A-5669-43CC-9F55-3A96799EB62C}" type="datetime1">
               <a:rPr lang="zh-TW" altLang="en-US" smtClean="0"/>
-              <a:t>2023/9/20</a:t>
+              <a:t>2024/11/3</a:t>
             </a:fld>
             <a:endParaRPr lang="zh-TW" altLang="en-US"/>
           </a:p>
@@ -6594,12 +6594,12 @@
           <a:graphicData uri="http://schemas.openxmlformats.org/presentationml/2006/ole">
             <mc:AlternateContent xmlns:mc="http://schemas.openxmlformats.org/markup-compatibility/2006">
               <mc:Choice xmlns:v="urn:schemas-microsoft-com:vml" Requires="v">
-                <p:oleObj spid="_x0000_s65775" name="Equation" r:id="rId4" imgW="2590800" imgH="685800" progId="Equation.DSMT4">
+                <p:oleObj name="Equation" r:id="rId3" imgW="2590800" imgH="685800" progId="Equation.DSMT4">
                   <p:embed/>
                 </p:oleObj>
               </mc:Choice>
               <mc:Fallback>
-                <p:oleObj name="Equation" r:id="rId4" imgW="2590800" imgH="685800" progId="Equation.DSMT4">
+                <p:oleObj name="Equation" r:id="rId3" imgW="2590800" imgH="685800" progId="Equation.DSMT4">
                   <p:embed/>
                   <p:pic>
                     <p:nvPicPr>
@@ -6610,7 +6610,7 @@
                       <p:nvPr/>
                     </p:nvPicPr>
                     <p:blipFill>
-                      <a:blip r:embed="rId5">
+                      <a:blip r:embed="rId4">
                         <a:extLst>
                           <a:ext uri="{28A0092B-C50C-407E-A947-70E740481C1C}">
                             <a14:useLocalDpi xmlns:a14="http://schemas.microsoft.com/office/drawing/2010/main" val="0"/>
@@ -7347,12 +7347,12 @@
           <a:graphicData uri="http://schemas.openxmlformats.org/presentationml/2006/ole">
             <mc:AlternateContent xmlns:mc="http://schemas.openxmlformats.org/markup-compatibility/2006">
               <mc:Choice xmlns:v="urn:schemas-microsoft-com:vml" Requires="v">
-                <p:oleObj spid="_x0000_s65776" name="Equation" r:id="rId6" imgW="2540000" imgH="508000" progId="Equation.DSMT4">
+                <p:oleObj name="Equation" r:id="rId5" imgW="2540000" imgH="508000" progId="Equation.DSMT4">
                   <p:embed/>
                 </p:oleObj>
               </mc:Choice>
               <mc:Fallback>
-                <p:oleObj name="Equation" r:id="rId6" imgW="2540000" imgH="508000" progId="Equation.DSMT4">
+                <p:oleObj name="Equation" r:id="rId5" imgW="2540000" imgH="508000" progId="Equation.DSMT4">
                   <p:embed/>
                   <p:pic>
                     <p:nvPicPr>
@@ -7363,7 +7363,7 @@
                       <p:nvPr/>
                     </p:nvPicPr>
                     <p:blipFill>
-                      <a:blip r:embed="rId7">
+                      <a:blip r:embed="rId6">
                         <a:extLst>
                           <a:ext uri="{28A0092B-C50C-407E-A947-70E740481C1C}">
                             <a14:useLocalDpi xmlns:a14="http://schemas.microsoft.com/office/drawing/2010/main" val="0"/>
@@ -7598,12 +7598,12 @@
           <a:graphicData uri="http://schemas.openxmlformats.org/presentationml/2006/ole">
             <mc:AlternateContent xmlns:mc="http://schemas.openxmlformats.org/markup-compatibility/2006">
               <mc:Choice xmlns:v="urn:schemas-microsoft-com:vml" Requires="v">
-                <p:oleObj spid="_x0000_s65777" name="Equation" r:id="rId8" imgW="939800" imgH="609600" progId="Equation.DSMT4">
+                <p:oleObj name="Equation" r:id="rId7" imgW="939800" imgH="609600" progId="Equation.DSMT4">
                   <p:embed/>
                 </p:oleObj>
               </mc:Choice>
               <mc:Fallback>
-                <p:oleObj name="Equation" r:id="rId8" imgW="939800" imgH="609600" progId="Equation.DSMT4">
+                <p:oleObj name="Equation" r:id="rId7" imgW="939800" imgH="609600" progId="Equation.DSMT4">
                   <p:embed/>
                   <p:pic>
                     <p:nvPicPr>
@@ -7614,7 +7614,7 @@
                       <p:nvPr/>
                     </p:nvPicPr>
                     <p:blipFill>
-                      <a:blip r:embed="rId9">
+                      <a:blip r:embed="rId8">
                         <a:extLst>
                           <a:ext uri="{28A0092B-C50C-407E-A947-70E740481C1C}">
                             <a14:useLocalDpi xmlns:a14="http://schemas.microsoft.com/office/drawing/2010/main" val="0"/>
@@ -8130,12 +8130,12 @@
           <a:graphicData uri="http://schemas.openxmlformats.org/presentationml/2006/ole">
             <mc:AlternateContent xmlns:mc="http://schemas.openxmlformats.org/markup-compatibility/2006">
               <mc:Choice xmlns:v="urn:schemas-microsoft-com:vml" Requires="v">
-                <p:oleObj spid="_x0000_s66720" name="Equation" r:id="rId3" imgW="2070100" imgH="660400" progId="Equation.DSMT4">
+                <p:oleObj name="Equation" r:id="rId2" imgW="2070100" imgH="660400" progId="Equation.DSMT4">
                   <p:embed/>
                 </p:oleObj>
               </mc:Choice>
               <mc:Fallback>
-                <p:oleObj name="Equation" r:id="rId3" imgW="2070100" imgH="660400" progId="Equation.DSMT4">
+                <p:oleObj name="Equation" r:id="rId2" imgW="2070100" imgH="660400" progId="Equation.DSMT4">
                   <p:embed/>
                   <p:pic>
                     <p:nvPicPr>
@@ -8146,7 +8146,7 @@
                       <p:nvPr/>
                     </p:nvPicPr>
                     <p:blipFill>
-                      <a:blip r:embed="rId4">
+                      <a:blip r:embed="rId3">
                         <a:extLst>
                           <a:ext uri="{28A0092B-C50C-407E-A947-70E740481C1C}">
                             <a14:useLocalDpi xmlns:a14="http://schemas.microsoft.com/office/drawing/2010/main" val="0"/>
@@ -8611,12 +8611,12 @@
           <a:graphicData uri="http://schemas.openxmlformats.org/presentationml/2006/ole">
             <mc:AlternateContent xmlns:mc="http://schemas.openxmlformats.org/markup-compatibility/2006">
               <mc:Choice xmlns:v="urn:schemas-microsoft-com:vml" Requires="v">
-                <p:oleObj spid="_x0000_s66721" name="Equation" r:id="rId5" imgW="4279680" imgH="660240" progId="Equation.DSMT4">
+                <p:oleObj name="Equation" r:id="rId4" imgW="4279680" imgH="660240" progId="Equation.DSMT4">
                   <p:embed/>
                 </p:oleObj>
               </mc:Choice>
               <mc:Fallback>
-                <p:oleObj name="Equation" r:id="rId5" imgW="4279680" imgH="660240" progId="Equation.DSMT4">
+                <p:oleObj name="Equation" r:id="rId4" imgW="4279680" imgH="660240" progId="Equation.DSMT4">
                   <p:embed/>
                   <p:pic>
                     <p:nvPicPr>
@@ -8627,7 +8627,7 @@
                       <p:nvPr/>
                     </p:nvPicPr>
                     <p:blipFill>
-                      <a:blip r:embed="rId6"/>
+                      <a:blip r:embed="rId5"/>
                       <a:srcRect/>
                       <a:stretch>
                         <a:fillRect/>
@@ -11285,12 +11285,12 @@
           <a:graphicData uri="http://schemas.openxmlformats.org/presentationml/2006/ole">
             <mc:AlternateContent xmlns:mc="http://schemas.openxmlformats.org/markup-compatibility/2006">
               <mc:Choice xmlns:v="urn:schemas-microsoft-com:vml" Requires="v">
-                <p:oleObj spid="_x0000_s67981" name="Equation" r:id="rId3" imgW="2540000" imgH="508000" progId="Equation.DSMT4">
+                <p:oleObj name="Equation" r:id="rId2" imgW="2540000" imgH="508000" progId="Equation.DSMT4">
                   <p:embed/>
                 </p:oleObj>
               </mc:Choice>
               <mc:Fallback>
-                <p:oleObj name="Equation" r:id="rId3" imgW="2540000" imgH="508000" progId="Equation.DSMT4">
+                <p:oleObj name="Equation" r:id="rId2" imgW="2540000" imgH="508000" progId="Equation.DSMT4">
                   <p:embed/>
                   <p:pic>
                     <p:nvPicPr>
@@ -11301,7 +11301,7 @@
                       <p:nvPr/>
                     </p:nvPicPr>
                     <p:blipFill>
-                      <a:blip r:embed="rId4">
+                      <a:blip r:embed="rId3">
                         <a:extLst>
                           <a:ext uri="{28A0092B-C50C-407E-A947-70E740481C1C}">
                             <a14:useLocalDpi xmlns:a14="http://schemas.microsoft.com/office/drawing/2010/main" val="0"/>
@@ -11368,12 +11368,12 @@
           <a:graphicData uri="http://schemas.openxmlformats.org/presentationml/2006/ole">
             <mc:AlternateContent xmlns:mc="http://schemas.openxmlformats.org/markup-compatibility/2006">
               <mc:Choice xmlns:v="urn:schemas-microsoft-com:vml" Requires="v">
-                <p:oleObj spid="_x0000_s67982" name="Equation" r:id="rId5" imgW="5854700" imgH="571500" progId="Equation.DSMT4">
+                <p:oleObj name="Equation" r:id="rId4" imgW="5854700" imgH="571500" progId="Equation.DSMT4">
                   <p:embed/>
                 </p:oleObj>
               </mc:Choice>
               <mc:Fallback>
-                <p:oleObj name="Equation" r:id="rId5" imgW="5854700" imgH="571500" progId="Equation.DSMT4">
+                <p:oleObj name="Equation" r:id="rId4" imgW="5854700" imgH="571500" progId="Equation.DSMT4">
                   <p:embed/>
                   <p:pic>
                     <p:nvPicPr>
@@ -11384,7 +11384,7 @@
                       <p:nvPr/>
                     </p:nvPicPr>
                     <p:blipFill>
-                      <a:blip r:embed="rId6">
+                      <a:blip r:embed="rId5">
                         <a:extLst>
                           <a:ext uri="{28A0092B-C50C-407E-A947-70E740481C1C}">
                             <a14:useLocalDpi xmlns:a14="http://schemas.microsoft.com/office/drawing/2010/main" val="0"/>
@@ -11845,12 +11845,12 @@
           <a:graphicData uri="http://schemas.openxmlformats.org/presentationml/2006/ole">
             <mc:AlternateContent xmlns:mc="http://schemas.openxmlformats.org/markup-compatibility/2006">
               <mc:Choice xmlns:v="urn:schemas-microsoft-com:vml" Requires="v">
-                <p:oleObj spid="_x0000_s67983" name="Equation" r:id="rId7" imgW="1066800" imgH="508000" progId="Equation.DSMT4">
+                <p:oleObj name="Equation" r:id="rId6" imgW="1066800" imgH="508000" progId="Equation.DSMT4">
                   <p:embed/>
                 </p:oleObj>
               </mc:Choice>
               <mc:Fallback>
-                <p:oleObj name="Equation" r:id="rId7" imgW="1066800" imgH="508000" progId="Equation.DSMT4">
+                <p:oleObj name="Equation" r:id="rId6" imgW="1066800" imgH="508000" progId="Equation.DSMT4">
                   <p:embed/>
                   <p:pic>
                     <p:nvPicPr>
@@ -11861,7 +11861,7 @@
                       <p:nvPr/>
                     </p:nvPicPr>
                     <p:blipFill>
-                      <a:blip r:embed="rId8">
+                      <a:blip r:embed="rId7">
                         <a:extLst>
                           <a:ext uri="{28A0092B-C50C-407E-A947-70E740481C1C}">
                             <a14:useLocalDpi xmlns:a14="http://schemas.microsoft.com/office/drawing/2010/main" val="0"/>
@@ -12092,12 +12092,12 @@
           <a:graphicData uri="http://schemas.openxmlformats.org/presentationml/2006/ole">
             <mc:AlternateContent xmlns:mc="http://schemas.openxmlformats.org/markup-compatibility/2006">
               <mc:Choice xmlns:v="urn:schemas-microsoft-com:vml" Requires="v">
-                <p:oleObj spid="_x0000_s67984" name="Equation" r:id="rId9" imgW="1574117" imgH="634725" progId="Equation.DSMT4">
+                <p:oleObj name="Equation" r:id="rId8" imgW="1574117" imgH="634725" progId="Equation.DSMT4">
                   <p:embed/>
                 </p:oleObj>
               </mc:Choice>
               <mc:Fallback>
-                <p:oleObj name="Equation" r:id="rId9" imgW="1574117" imgH="634725" progId="Equation.DSMT4">
+                <p:oleObj name="Equation" r:id="rId8" imgW="1574117" imgH="634725" progId="Equation.DSMT4">
                   <p:embed/>
                   <p:pic>
                     <p:nvPicPr>
@@ -12108,7 +12108,7 @@
                       <p:nvPr/>
                     </p:nvPicPr>
                     <p:blipFill>
-                      <a:blip r:embed="rId10">
+                      <a:blip r:embed="rId9">
                         <a:extLst>
                           <a:ext uri="{28A0092B-C50C-407E-A947-70E740481C1C}">
                             <a14:useLocalDpi xmlns:a14="http://schemas.microsoft.com/office/drawing/2010/main" val="0"/>
@@ -12175,12 +12175,12 @@
           <a:graphicData uri="http://schemas.openxmlformats.org/presentationml/2006/ole">
             <mc:AlternateContent xmlns:mc="http://schemas.openxmlformats.org/markup-compatibility/2006">
               <mc:Choice xmlns:v="urn:schemas-microsoft-com:vml" Requires="v">
-                <p:oleObj spid="_x0000_s67985" name="Equation" r:id="rId11" imgW="2933700" imgH="1168400" progId="Equation.DSMT4">
+                <p:oleObj name="Equation" r:id="rId10" imgW="2933700" imgH="1168400" progId="Equation.DSMT4">
                   <p:embed/>
                 </p:oleObj>
               </mc:Choice>
               <mc:Fallback>
-                <p:oleObj name="Equation" r:id="rId11" imgW="2933700" imgH="1168400" progId="Equation.DSMT4">
+                <p:oleObj name="Equation" r:id="rId10" imgW="2933700" imgH="1168400" progId="Equation.DSMT4">
                   <p:embed/>
                   <p:pic>
                     <p:nvPicPr>
@@ -12191,7 +12191,7 @@
                       <p:nvPr/>
                     </p:nvPicPr>
                     <p:blipFill>
-                      <a:blip r:embed="rId12">
+                      <a:blip r:embed="rId11">
                         <a:extLst>
                           <a:ext uri="{28A0092B-C50C-407E-A947-70E740481C1C}">
                             <a14:useLocalDpi xmlns:a14="http://schemas.microsoft.com/office/drawing/2010/main" val="0"/>
@@ -14124,7 +14124,7 @@
           <p:nvPr/>
         </p:nvPicPr>
         <p:blipFill>
-          <a:blip r:embed="rId3">
+          <a:blip r:embed="rId2">
             <a:extLst>
               <a:ext uri="{28A0092B-C50C-407E-A947-70E740481C1C}">
                 <a14:useLocalDpi xmlns:a14="http://schemas.microsoft.com/office/drawing/2010/main" val="0"/>
@@ -14407,7 +14407,7 @@
           <p:nvPr/>
         </p:nvPicPr>
         <p:blipFill>
-          <a:blip r:embed="rId4">
+          <a:blip r:embed="rId3">
             <a:extLst>
               <a:ext uri="{28A0092B-C50C-407E-A947-70E740481C1C}">
                 <a14:useLocalDpi xmlns:a14="http://schemas.microsoft.com/office/drawing/2010/main" val="0"/>
@@ -14468,12 +14468,12 @@
           <a:graphicData uri="http://schemas.openxmlformats.org/presentationml/2006/ole">
             <mc:AlternateContent xmlns:mc="http://schemas.openxmlformats.org/markup-compatibility/2006">
               <mc:Choice xmlns:v="urn:schemas-microsoft-com:vml" Requires="v">
-                <p:oleObj spid="_x0000_s68689" name="Equation" r:id="rId5" imgW="2590800" imgH="685800" progId="Equation.DSMT4">
+                <p:oleObj name="Equation" r:id="rId4" imgW="2590800" imgH="685800" progId="Equation.DSMT4">
                   <p:embed/>
                 </p:oleObj>
               </mc:Choice>
               <mc:Fallback>
-                <p:oleObj name="Equation" r:id="rId5" imgW="2590800" imgH="685800" progId="Equation.DSMT4">
+                <p:oleObj name="Equation" r:id="rId4" imgW="2590800" imgH="685800" progId="Equation.DSMT4">
                   <p:embed/>
                   <p:pic>
                     <p:nvPicPr>
@@ -14484,7 +14484,7 @@
                       <p:nvPr/>
                     </p:nvPicPr>
                     <p:blipFill>
-                      <a:blip r:embed="rId6">
+                      <a:blip r:embed="rId5">
                         <a:extLst>
                           <a:ext uri="{28A0092B-C50C-407E-A947-70E740481C1C}">
                             <a14:useLocalDpi xmlns:a14="http://schemas.microsoft.com/office/drawing/2010/main" val="0"/>
@@ -15073,12 +15073,12 @@
           <a:graphicData uri="http://schemas.openxmlformats.org/presentationml/2006/ole">
             <mc:AlternateContent xmlns:mc="http://schemas.openxmlformats.org/markup-compatibility/2006">
               <mc:Choice xmlns:v="urn:schemas-microsoft-com:vml" Requires="v">
-                <p:oleObj spid="_x0000_s69871" name="Equation" r:id="rId3" imgW="2044700" imgH="660400" progId="Equation.DSMT4">
+                <p:oleObj name="Equation" r:id="rId2" imgW="2044700" imgH="660400" progId="Equation.DSMT4">
                   <p:embed/>
                 </p:oleObj>
               </mc:Choice>
               <mc:Fallback>
-                <p:oleObj name="Equation" r:id="rId3" imgW="2044700" imgH="660400" progId="Equation.DSMT4">
+                <p:oleObj name="Equation" r:id="rId2" imgW="2044700" imgH="660400" progId="Equation.DSMT4">
                   <p:embed/>
                   <p:pic>
                     <p:nvPicPr>
@@ -15089,7 +15089,7 @@
                       <p:nvPr/>
                     </p:nvPicPr>
                     <p:blipFill>
-                      <a:blip r:embed="rId4">
+                      <a:blip r:embed="rId3">
                         <a:extLst>
                           <a:ext uri="{28A0092B-C50C-407E-A947-70E740481C1C}">
                             <a14:useLocalDpi xmlns:a14="http://schemas.microsoft.com/office/drawing/2010/main" val="0"/>
@@ -15156,12 +15156,12 @@
           <a:graphicData uri="http://schemas.openxmlformats.org/presentationml/2006/ole">
             <mc:AlternateContent xmlns:mc="http://schemas.openxmlformats.org/markup-compatibility/2006">
               <mc:Choice xmlns:v="urn:schemas-microsoft-com:vml" Requires="v">
-                <p:oleObj spid="_x0000_s69872" name="Equation" r:id="rId5" imgW="2654300" imgH="660400" progId="Equation.DSMT4">
+                <p:oleObj name="Equation" r:id="rId4" imgW="2654300" imgH="660400" progId="Equation.DSMT4">
                   <p:embed/>
                 </p:oleObj>
               </mc:Choice>
               <mc:Fallback>
-                <p:oleObj name="Equation" r:id="rId5" imgW="2654300" imgH="660400" progId="Equation.DSMT4">
+                <p:oleObj name="Equation" r:id="rId4" imgW="2654300" imgH="660400" progId="Equation.DSMT4">
                   <p:embed/>
                   <p:pic>
                     <p:nvPicPr>
@@ -15172,7 +15172,7 @@
                       <p:nvPr/>
                     </p:nvPicPr>
                     <p:blipFill>
-                      <a:blip r:embed="rId6">
+                      <a:blip r:embed="rId5">
                         <a:extLst>
                           <a:ext uri="{28A0092B-C50C-407E-A947-70E740481C1C}">
                             <a14:useLocalDpi xmlns:a14="http://schemas.microsoft.com/office/drawing/2010/main" val="0"/>
@@ -15784,12 +15784,12 @@
           <a:graphicData uri="http://schemas.openxmlformats.org/presentationml/2006/ole">
             <mc:AlternateContent xmlns:mc="http://schemas.openxmlformats.org/markup-compatibility/2006">
               <mc:Choice xmlns:v="urn:schemas-microsoft-com:vml" Requires="v">
-                <p:oleObj spid="_x0000_s69873" name="Equation" r:id="rId7" imgW="2908080" imgH="634680" progId="Equation.DSMT4">
+                <p:oleObj name="Equation" r:id="rId6" imgW="2908080" imgH="634680" progId="Equation.DSMT4">
                   <p:embed/>
                 </p:oleObj>
               </mc:Choice>
               <mc:Fallback>
-                <p:oleObj name="Equation" r:id="rId7" imgW="2908080" imgH="634680" progId="Equation.DSMT4">
+                <p:oleObj name="Equation" r:id="rId6" imgW="2908080" imgH="634680" progId="Equation.DSMT4">
                   <p:embed/>
                   <p:pic>
                     <p:nvPicPr>
@@ -15800,7 +15800,7 @@
                       <p:nvPr/>
                     </p:nvPicPr>
                     <p:blipFill>
-                      <a:blip r:embed="rId8">
+                      <a:blip r:embed="rId7">
                         <a:extLst>
                           <a:ext uri="{28A0092B-C50C-407E-A947-70E740481C1C}">
                             <a14:useLocalDpi xmlns:a14="http://schemas.microsoft.com/office/drawing/2010/main" val="0"/>
@@ -16028,7 +16028,7 @@
           <p:nvPr/>
         </p:nvPicPr>
         <p:blipFill>
-          <a:blip r:embed="rId9">
+          <a:blip r:embed="rId8">
             <a:extLst>
               <a:ext uri="{28A0092B-C50C-407E-A947-70E740481C1C}">
                 <a14:useLocalDpi xmlns:a14="http://schemas.microsoft.com/office/drawing/2010/main" val="0"/>
@@ -16687,12 +16687,12 @@
           <a:graphicData uri="http://schemas.openxmlformats.org/presentationml/2006/ole">
             <mc:AlternateContent xmlns:mc="http://schemas.openxmlformats.org/markup-compatibility/2006">
               <mc:Choice xmlns:v="urn:schemas-microsoft-com:vml" Requires="v">
-                <p:oleObj spid="_x0000_s70736" name="Equation" r:id="rId3" imgW="3543300" imgH="736600" progId="Equation.DSMT4">
+                <p:oleObj name="Equation" r:id="rId2" imgW="3543300" imgH="736600" progId="Equation.DSMT4">
                   <p:embed/>
                 </p:oleObj>
               </mc:Choice>
               <mc:Fallback>
-                <p:oleObj name="Equation" r:id="rId3" imgW="3543300" imgH="736600" progId="Equation.DSMT4">
+                <p:oleObj name="Equation" r:id="rId2" imgW="3543300" imgH="736600" progId="Equation.DSMT4">
                   <p:embed/>
                   <p:pic>
                     <p:nvPicPr>
@@ -16703,7 +16703,7 @@
                       <p:nvPr/>
                     </p:nvPicPr>
                     <p:blipFill>
-                      <a:blip r:embed="rId4">
+                      <a:blip r:embed="rId3">
                         <a:extLst>
                           <a:ext uri="{28A0092B-C50C-407E-A947-70E740481C1C}">
                             <a14:useLocalDpi xmlns:a14="http://schemas.microsoft.com/office/drawing/2010/main" val="0"/>
@@ -19276,9 +19276,7 @@
           <p:cNvGraphicFramePr>
             <a:graphicFrameLocks noChangeAspect="1"/>
           </p:cNvGraphicFramePr>
-          <p:nvPr>
-            <p:extLst/>
-          </p:nvPr>
+          <p:nvPr/>
         </p:nvGraphicFramePr>
         <p:xfrm>
           <a:off x="2190066" y="1039979"/>
@@ -19288,12 +19286,12 @@
           <a:graphicData uri="http://schemas.openxmlformats.org/presentationml/2006/ole">
             <mc:AlternateContent xmlns:mc="http://schemas.openxmlformats.org/markup-compatibility/2006">
               <mc:Choice xmlns:v="urn:schemas-microsoft-com:vml" Requires="v">
-                <p:oleObj spid="_x0000_s73302" name="Equation" r:id="rId3" imgW="2031840" imgH="368280" progId="Equation.DSMT4">
+                <p:oleObj name="Equation" r:id="rId2" imgW="2031840" imgH="368280" progId="Equation.DSMT4">
                   <p:embed/>
                 </p:oleObj>
               </mc:Choice>
               <mc:Fallback>
-                <p:oleObj name="Equation" r:id="rId3" imgW="2031840" imgH="368280" progId="Equation.DSMT4">
+                <p:oleObj name="Equation" r:id="rId2" imgW="2031840" imgH="368280" progId="Equation.DSMT4">
                   <p:embed/>
                   <p:pic>
                     <p:nvPicPr>
@@ -19304,7 +19302,7 @@
                       <p:nvPr/>
                     </p:nvPicPr>
                     <p:blipFill>
-                      <a:blip r:embed="rId4"/>
+                      <a:blip r:embed="rId3"/>
                       <a:srcRect/>
                       <a:stretch>
                         <a:fillRect/>
@@ -19355,9 +19353,7 @@
           <p:cNvGraphicFramePr>
             <a:graphicFrameLocks noChangeAspect="1"/>
           </p:cNvGraphicFramePr>
-          <p:nvPr>
-            <p:extLst/>
-          </p:nvPr>
+          <p:nvPr/>
         </p:nvGraphicFramePr>
         <p:xfrm>
           <a:off x="4913214" y="1035386"/>
@@ -19367,12 +19363,12 @@
           <a:graphicData uri="http://schemas.openxmlformats.org/presentationml/2006/ole">
             <mc:AlternateContent xmlns:mc="http://schemas.openxmlformats.org/markup-compatibility/2006">
               <mc:Choice xmlns:v="urn:schemas-microsoft-com:vml" Requires="v">
-                <p:oleObj spid="_x0000_s73303" name="Equation" r:id="rId5" imgW="2247840" imgH="368280" progId="Equation.DSMT4">
+                <p:oleObj name="Equation" r:id="rId4" imgW="2247840" imgH="368280" progId="Equation.DSMT4">
                   <p:embed/>
                 </p:oleObj>
               </mc:Choice>
               <mc:Fallback>
-                <p:oleObj name="Equation" r:id="rId5" imgW="2247840" imgH="368280" progId="Equation.DSMT4">
+                <p:oleObj name="Equation" r:id="rId4" imgW="2247840" imgH="368280" progId="Equation.DSMT4">
                   <p:embed/>
                   <p:pic>
                     <p:nvPicPr>
@@ -19383,7 +19379,7 @@
                       <p:nvPr/>
                     </p:nvPicPr>
                     <p:blipFill>
-                      <a:blip r:embed="rId6"/>
+                      <a:blip r:embed="rId5"/>
                       <a:srcRect/>
                       <a:stretch>
                         <a:fillRect/>
@@ -19434,9 +19430,7 @@
           <p:cNvGraphicFramePr>
             <a:graphicFrameLocks noChangeAspect="1"/>
           </p:cNvGraphicFramePr>
-          <p:nvPr>
-            <p:extLst/>
-          </p:nvPr>
+          <p:nvPr/>
         </p:nvGraphicFramePr>
         <p:xfrm>
           <a:off x="2103438" y="1620838"/>
@@ -19446,12 +19440,12 @@
           <a:graphicData uri="http://schemas.openxmlformats.org/presentationml/2006/ole">
             <mc:AlternateContent xmlns:mc="http://schemas.openxmlformats.org/markup-compatibility/2006">
               <mc:Choice xmlns:v="urn:schemas-microsoft-com:vml" Requires="v">
-                <p:oleObj spid="_x0000_s73304" name="Equation" r:id="rId7" imgW="4851360" imgH="419040" progId="Equation.DSMT4">
+                <p:oleObj name="Equation" r:id="rId6" imgW="4851360" imgH="419040" progId="Equation.DSMT4">
                   <p:embed/>
                 </p:oleObj>
               </mc:Choice>
               <mc:Fallback>
-                <p:oleObj name="Equation" r:id="rId7" imgW="4851360" imgH="419040" progId="Equation.DSMT4">
+                <p:oleObj name="Equation" r:id="rId6" imgW="4851360" imgH="419040" progId="Equation.DSMT4">
                   <p:embed/>
                   <p:pic>
                     <p:nvPicPr>
@@ -19462,7 +19456,7 @@
                       <p:nvPr/>
                     </p:nvPicPr>
                     <p:blipFill>
-                      <a:blip r:embed="rId8"/>
+                      <a:blip r:embed="rId7"/>
                       <a:srcRect/>
                       <a:stretch>
                         <a:fillRect/>
@@ -19480,7 +19474,6 @@
                       <a:ln>
                         <a:noFill/>
                       </a:ln>
-                      <a:extLst/>
                     </p:spPr>
                   </p:pic>
                 </p:oleObj>
@@ -19644,12 +19637,12 @@
           <a:graphicData uri="http://schemas.openxmlformats.org/presentationml/2006/ole">
             <mc:AlternateContent xmlns:mc="http://schemas.openxmlformats.org/markup-compatibility/2006">
               <mc:Choice xmlns:v="urn:schemas-microsoft-com:vml" Requires="v">
-                <p:oleObj spid="_x0000_s73305" name="Equation" r:id="rId9" imgW="1841400" imgH="368280" progId="Equation.DSMT4">
+                <p:oleObj name="Equation" r:id="rId8" imgW="1841400" imgH="368280" progId="Equation.DSMT4">
                   <p:embed/>
                 </p:oleObj>
               </mc:Choice>
               <mc:Fallback>
-                <p:oleObj name="Equation" r:id="rId9" imgW="1841400" imgH="368280" progId="Equation.DSMT4">
+                <p:oleObj name="Equation" r:id="rId8" imgW="1841400" imgH="368280" progId="Equation.DSMT4">
                   <p:embed/>
                   <p:pic>
                     <p:nvPicPr>
@@ -19658,7 +19651,7 @@
                       <p:nvPr/>
                     </p:nvPicPr>
                     <p:blipFill>
-                      <a:blip r:embed="rId10"/>
+                      <a:blip r:embed="rId9"/>
                       <a:stretch>
                         <a:fillRect/>
                       </a:stretch>
@@ -19750,12 +19743,12 @@
           <a:graphicData uri="http://schemas.openxmlformats.org/presentationml/2006/ole">
             <mc:AlternateContent xmlns:mc="http://schemas.openxmlformats.org/markup-compatibility/2006">
               <mc:Choice xmlns:v="urn:schemas-microsoft-com:vml" Requires="v">
-                <p:oleObj spid="_x0000_s73306" name="Equation" r:id="rId11" imgW="1015920" imgH="368280" progId="Equation.DSMT4">
+                <p:oleObj name="Equation" r:id="rId10" imgW="1015920" imgH="368280" progId="Equation.DSMT4">
                   <p:embed/>
                 </p:oleObj>
               </mc:Choice>
               <mc:Fallback>
-                <p:oleObj name="Equation" r:id="rId11" imgW="1015920" imgH="368280" progId="Equation.DSMT4">
+                <p:oleObj name="Equation" r:id="rId10" imgW="1015920" imgH="368280" progId="Equation.DSMT4">
                   <p:embed/>
                   <p:pic>
                     <p:nvPicPr>
@@ -19764,7 +19757,7 @@
                       <p:nvPr/>
                     </p:nvPicPr>
                     <p:blipFill>
-                      <a:blip r:embed="rId12"/>
+                      <a:blip r:embed="rId11"/>
                       <a:stretch>
                         <a:fillRect/>
                       </a:stretch>
@@ -19872,12 +19865,12 @@
           <a:graphicData uri="http://schemas.openxmlformats.org/presentationml/2006/ole">
             <mc:AlternateContent xmlns:mc="http://schemas.openxmlformats.org/markup-compatibility/2006">
               <mc:Choice xmlns:v="urn:schemas-microsoft-com:vml" Requires="v">
-                <p:oleObj spid="_x0000_s73307" name="Equation" r:id="rId13" imgW="1828800" imgH="368280" progId="Equation.DSMT4">
+                <p:oleObj name="Equation" r:id="rId12" imgW="1828800" imgH="368280" progId="Equation.DSMT4">
                   <p:embed/>
                 </p:oleObj>
               </mc:Choice>
               <mc:Fallback>
-                <p:oleObj name="Equation" r:id="rId13" imgW="1828800" imgH="368280" progId="Equation.DSMT4">
+                <p:oleObj name="Equation" r:id="rId12" imgW="1828800" imgH="368280" progId="Equation.DSMT4">
                   <p:embed/>
                   <p:pic>
                     <p:nvPicPr>
@@ -19886,7 +19879,7 @@
                       <p:nvPr/>
                     </p:nvPicPr>
                     <p:blipFill>
-                      <a:blip r:embed="rId14"/>
+                      <a:blip r:embed="rId13"/>
                       <a:stretch>
                         <a:fillRect/>
                       </a:stretch>
@@ -19978,12 +19971,12 @@
           <a:graphicData uri="http://schemas.openxmlformats.org/presentationml/2006/ole">
             <mc:AlternateContent xmlns:mc="http://schemas.openxmlformats.org/markup-compatibility/2006">
               <mc:Choice xmlns:v="urn:schemas-microsoft-com:vml" Requires="v">
-                <p:oleObj spid="_x0000_s73308" name="Equation" r:id="rId15" imgW="1002960" imgH="368280" progId="Equation.DSMT4">
+                <p:oleObj name="Equation" r:id="rId14" imgW="1002960" imgH="368280" progId="Equation.DSMT4">
                   <p:embed/>
                 </p:oleObj>
               </mc:Choice>
               <mc:Fallback>
-                <p:oleObj name="Equation" r:id="rId15" imgW="1002960" imgH="368280" progId="Equation.DSMT4">
+                <p:oleObj name="Equation" r:id="rId14" imgW="1002960" imgH="368280" progId="Equation.DSMT4">
                   <p:embed/>
                   <p:pic>
                     <p:nvPicPr>
@@ -19992,7 +19985,7 @@
                       <p:nvPr/>
                     </p:nvPicPr>
                     <p:blipFill>
-                      <a:blip r:embed="rId16"/>
+                      <a:blip r:embed="rId15"/>
                       <a:stretch>
                         <a:fillRect/>
                       </a:stretch>
@@ -20100,12 +20093,12 @@
           <a:graphicData uri="http://schemas.openxmlformats.org/presentationml/2006/ole">
             <mc:AlternateContent xmlns:mc="http://schemas.openxmlformats.org/markup-compatibility/2006">
               <mc:Choice xmlns:v="urn:schemas-microsoft-com:vml" Requires="v">
-                <p:oleObj spid="_x0000_s73309" name="Equation" r:id="rId17" imgW="2323800" imgH="368280" progId="Equation.DSMT4">
+                <p:oleObj name="Equation" r:id="rId16" imgW="2323800" imgH="368280" progId="Equation.DSMT4">
                   <p:embed/>
                 </p:oleObj>
               </mc:Choice>
               <mc:Fallback>
-                <p:oleObj name="Equation" r:id="rId17" imgW="2323800" imgH="368280" progId="Equation.DSMT4">
+                <p:oleObj name="Equation" r:id="rId16" imgW="2323800" imgH="368280" progId="Equation.DSMT4">
                   <p:embed/>
                   <p:pic>
                     <p:nvPicPr>
@@ -20116,7 +20109,7 @@
                       <p:nvPr/>
                     </p:nvPicPr>
                     <p:blipFill>
-                      <a:blip r:embed="rId18"/>
+                      <a:blip r:embed="rId17"/>
                       <a:srcRect/>
                       <a:stretch>
                         <a:fillRect/>
@@ -20134,7 +20127,6 @@
                       <a:ln>
                         <a:noFill/>
                       </a:ln>
-                      <a:extLst/>
                     </p:spPr>
                   </p:pic>
                 </p:oleObj>
@@ -20195,12 +20187,12 @@
           <a:graphicData uri="http://schemas.openxmlformats.org/presentationml/2006/ole">
             <mc:AlternateContent xmlns:mc="http://schemas.openxmlformats.org/markup-compatibility/2006">
               <mc:Choice xmlns:v="urn:schemas-microsoft-com:vml" Requires="v">
-                <p:oleObj spid="_x0000_s72147" name="Equation" r:id="rId3" imgW="2031840" imgH="368280" progId="Equation.DSMT4">
+                <p:oleObj name="Equation" r:id="rId2" imgW="2031840" imgH="368280" progId="Equation.DSMT4">
                   <p:embed/>
                 </p:oleObj>
               </mc:Choice>
               <mc:Fallback>
-                <p:oleObj name="Equation" r:id="rId3" imgW="2031840" imgH="368280" progId="Equation.DSMT4">
+                <p:oleObj name="Equation" r:id="rId2" imgW="2031840" imgH="368280" progId="Equation.DSMT4">
                   <p:embed/>
                   <p:pic>
                     <p:nvPicPr>
@@ -20211,7 +20203,7 @@
                       <p:nvPr/>
                     </p:nvPicPr>
                     <p:blipFill>
-                      <a:blip r:embed="rId4"/>
+                      <a:blip r:embed="rId3"/>
                       <a:srcRect/>
                       <a:stretch>
                         <a:fillRect/>
@@ -20278,12 +20270,12 @@
           <a:graphicData uri="http://schemas.openxmlformats.org/presentationml/2006/ole">
             <mc:AlternateContent xmlns:mc="http://schemas.openxmlformats.org/markup-compatibility/2006">
               <mc:Choice xmlns:v="urn:schemas-microsoft-com:vml" Requires="v">
-                <p:oleObj spid="_x0000_s72148" name="Equation" r:id="rId5" imgW="2247840" imgH="368280" progId="Equation.DSMT4">
+                <p:oleObj name="Equation" r:id="rId4" imgW="2247840" imgH="368280" progId="Equation.DSMT4">
                   <p:embed/>
                 </p:oleObj>
               </mc:Choice>
               <mc:Fallback>
-                <p:oleObj name="Equation" r:id="rId5" imgW="2247840" imgH="368280" progId="Equation.DSMT4">
+                <p:oleObj name="Equation" r:id="rId4" imgW="2247840" imgH="368280" progId="Equation.DSMT4">
                   <p:embed/>
                   <p:pic>
                     <p:nvPicPr>
@@ -20294,7 +20286,7 @@
                       <p:nvPr/>
                     </p:nvPicPr>
                     <p:blipFill>
-                      <a:blip r:embed="rId6"/>
+                      <a:blip r:embed="rId5"/>
                       <a:srcRect/>
                       <a:stretch>
                         <a:fillRect/>
@@ -20361,12 +20353,12 @@
           <a:graphicData uri="http://schemas.openxmlformats.org/presentationml/2006/ole">
             <mc:AlternateContent xmlns:mc="http://schemas.openxmlformats.org/markup-compatibility/2006">
               <mc:Choice xmlns:v="urn:schemas-microsoft-com:vml" Requires="v">
-                <p:oleObj spid="_x0000_s72149" name="Equation" r:id="rId7" imgW="4851360" imgH="419040" progId="Equation.DSMT4">
+                <p:oleObj name="Equation" r:id="rId6" imgW="4851360" imgH="419040" progId="Equation.DSMT4">
                   <p:embed/>
                 </p:oleObj>
               </mc:Choice>
               <mc:Fallback>
-                <p:oleObj name="Equation" r:id="rId7" imgW="4851360" imgH="419040" progId="Equation.DSMT4">
+                <p:oleObj name="Equation" r:id="rId6" imgW="4851360" imgH="419040" progId="Equation.DSMT4">
                   <p:embed/>
                   <p:pic>
                     <p:nvPicPr>
@@ -20377,7 +20369,7 @@
                       <p:nvPr/>
                     </p:nvPicPr>
                     <p:blipFill>
-                      <a:blip r:embed="rId8"/>
+                      <a:blip r:embed="rId7"/>
                       <a:srcRect/>
                       <a:stretch>
                         <a:fillRect/>
@@ -20395,7 +20387,6 @@
                       <a:ln>
                         <a:noFill/>
                       </a:ln>
-                      <a:extLst/>
                     </p:spPr>
                   </p:pic>
                 </p:oleObj>
@@ -20556,12 +20547,12 @@
           <a:graphicData uri="http://schemas.openxmlformats.org/presentationml/2006/ole">
             <mc:AlternateContent xmlns:mc="http://schemas.openxmlformats.org/markup-compatibility/2006">
               <mc:Choice xmlns:v="urn:schemas-microsoft-com:vml" Requires="v">
-                <p:oleObj spid="_x0000_s72150" name="Equation" r:id="rId9" imgW="901309" imgH="177723" progId="Equation.DSMT4">
+                <p:oleObj name="Equation" r:id="rId8" imgW="901309" imgH="177723" progId="Equation.DSMT4">
                   <p:embed/>
                 </p:oleObj>
               </mc:Choice>
               <mc:Fallback>
-                <p:oleObj name="Equation" r:id="rId9" imgW="901309" imgH="177723" progId="Equation.DSMT4">
+                <p:oleObj name="Equation" r:id="rId8" imgW="901309" imgH="177723" progId="Equation.DSMT4">
                   <p:embed/>
                   <p:pic>
                     <p:nvPicPr>
@@ -20572,7 +20563,7 @@
                       <p:nvPr/>
                     </p:nvPicPr>
                     <p:blipFill>
-                      <a:blip r:embed="rId10">
+                      <a:blip r:embed="rId9">
                         <a:extLst>
                           <a:ext uri="{28A0092B-C50C-407E-A947-70E740481C1C}">
                             <a14:useLocalDpi xmlns:a14="http://schemas.microsoft.com/office/drawing/2010/main" val="0"/>
@@ -20749,12 +20740,12 @@
           <a:graphicData uri="http://schemas.openxmlformats.org/presentationml/2006/ole">
             <mc:AlternateContent xmlns:mc="http://schemas.openxmlformats.org/markup-compatibility/2006">
               <mc:Choice xmlns:v="urn:schemas-microsoft-com:vml" Requires="v">
-                <p:oleObj spid="_x0000_s72151" name="Equation" r:id="rId11" imgW="1511280" imgH="393480" progId="Equation.DSMT4">
+                <p:oleObj name="Equation" r:id="rId10" imgW="1511280" imgH="393480" progId="Equation.DSMT4">
                   <p:embed/>
                 </p:oleObj>
               </mc:Choice>
               <mc:Fallback>
-                <p:oleObj name="Equation" r:id="rId11" imgW="1511280" imgH="393480" progId="Equation.DSMT4">
+                <p:oleObj name="Equation" r:id="rId10" imgW="1511280" imgH="393480" progId="Equation.DSMT4">
                   <p:embed/>
                   <p:pic>
                     <p:nvPicPr>
@@ -20763,7 +20754,7 @@
                       <p:nvPr/>
                     </p:nvPicPr>
                     <p:blipFill>
-                      <a:blip r:embed="rId12"/>
+                      <a:blip r:embed="rId11"/>
                       <a:stretch>
                         <a:fillRect/>
                       </a:stretch>
@@ -20836,12 +20827,12 @@
           <a:graphicData uri="http://schemas.openxmlformats.org/presentationml/2006/ole">
             <mc:AlternateContent xmlns:mc="http://schemas.openxmlformats.org/markup-compatibility/2006">
               <mc:Choice xmlns:v="urn:schemas-microsoft-com:vml" Requires="v">
-                <p:oleObj spid="_x0000_s72152" name="Equation" r:id="rId13" imgW="1015920" imgH="368280" progId="Equation.DSMT4">
+                <p:oleObj name="Equation" r:id="rId12" imgW="1015920" imgH="368280" progId="Equation.DSMT4">
                   <p:embed/>
                 </p:oleObj>
               </mc:Choice>
               <mc:Fallback>
-                <p:oleObj name="Equation" r:id="rId13" imgW="1015920" imgH="368280" progId="Equation.DSMT4">
+                <p:oleObj name="Equation" r:id="rId12" imgW="1015920" imgH="368280" progId="Equation.DSMT4">
                   <p:embed/>
                   <p:pic>
                     <p:nvPicPr>
@@ -20850,7 +20841,7 @@
                       <p:nvPr/>
                     </p:nvPicPr>
                     <p:blipFill>
-                      <a:blip r:embed="rId14"/>
+                      <a:blip r:embed="rId13"/>
                       <a:stretch>
                         <a:fillRect/>
                       </a:stretch>
@@ -20992,12 +20983,12 @@
           <a:graphicData uri="http://schemas.openxmlformats.org/presentationml/2006/ole">
             <mc:AlternateContent xmlns:mc="http://schemas.openxmlformats.org/markup-compatibility/2006">
               <mc:Choice xmlns:v="urn:schemas-microsoft-com:vml" Requires="v">
-                <p:oleObj spid="_x0000_s74070" name="Equation" r:id="rId3" imgW="1866600" imgH="368280" progId="Equation.DSMT4">
+                <p:oleObj name="Equation" r:id="rId2" imgW="1866600" imgH="368280" progId="Equation.DSMT4">
                   <p:embed/>
                 </p:oleObj>
               </mc:Choice>
               <mc:Fallback>
-                <p:oleObj name="Equation" r:id="rId3" imgW="1866600" imgH="368280" progId="Equation.DSMT4">
+                <p:oleObj name="Equation" r:id="rId2" imgW="1866600" imgH="368280" progId="Equation.DSMT4">
                   <p:embed/>
                   <p:pic>
                     <p:nvPicPr>
@@ -21006,7 +20997,7 @@
                       <p:nvPr/>
                     </p:nvPicPr>
                     <p:blipFill>
-                      <a:blip r:embed="rId4"/>
+                      <a:blip r:embed="rId3"/>
                       <a:stretch>
                         <a:fillRect/>
                       </a:stretch>
@@ -21049,12 +21040,12 @@
           <a:graphicData uri="http://schemas.openxmlformats.org/presentationml/2006/ole">
             <mc:AlternateContent xmlns:mc="http://schemas.openxmlformats.org/markup-compatibility/2006">
               <mc:Choice xmlns:v="urn:schemas-microsoft-com:vml" Requires="v">
-                <p:oleObj spid="_x0000_s74071" name="Equation" r:id="rId5" imgW="2031840" imgH="368280" progId="Equation.DSMT4">
+                <p:oleObj name="Equation" r:id="rId4" imgW="2031840" imgH="368280" progId="Equation.DSMT4">
                   <p:embed/>
                 </p:oleObj>
               </mc:Choice>
               <mc:Fallback>
-                <p:oleObj name="Equation" r:id="rId5" imgW="2031840" imgH="368280" progId="Equation.DSMT4">
+                <p:oleObj name="Equation" r:id="rId4" imgW="2031840" imgH="368280" progId="Equation.DSMT4">
                   <p:embed/>
                   <p:pic>
                     <p:nvPicPr>
@@ -21065,7 +21056,7 @@
                       <p:nvPr/>
                     </p:nvPicPr>
                     <p:blipFill>
-                      <a:blip r:embed="rId6"/>
+                      <a:blip r:embed="rId5"/>
                       <a:srcRect/>
                       <a:stretch>
                         <a:fillRect/>
@@ -21132,12 +21123,12 @@
           <a:graphicData uri="http://schemas.openxmlformats.org/presentationml/2006/ole">
             <mc:AlternateContent xmlns:mc="http://schemas.openxmlformats.org/markup-compatibility/2006">
               <mc:Choice xmlns:v="urn:schemas-microsoft-com:vml" Requires="v">
-                <p:oleObj spid="_x0000_s74072" name="Equation" r:id="rId7" imgW="1854000" imgH="368280" progId="Equation.DSMT4">
+                <p:oleObj name="Equation" r:id="rId6" imgW="1854000" imgH="368280" progId="Equation.DSMT4">
                   <p:embed/>
                 </p:oleObj>
               </mc:Choice>
               <mc:Fallback>
-                <p:oleObj name="Equation" r:id="rId7" imgW="1854000" imgH="368280" progId="Equation.DSMT4">
+                <p:oleObj name="Equation" r:id="rId6" imgW="1854000" imgH="368280" progId="Equation.DSMT4">
                   <p:embed/>
                   <p:pic>
                     <p:nvPicPr>
@@ -21146,7 +21137,7 @@
                       <p:nvPr/>
                     </p:nvPicPr>
                     <p:blipFill>
-                      <a:blip r:embed="rId8"/>
+                      <a:blip r:embed="rId7"/>
                       <a:stretch>
                         <a:fillRect/>
                       </a:stretch>
@@ -21189,12 +21180,12 @@
           <a:graphicData uri="http://schemas.openxmlformats.org/presentationml/2006/ole">
             <mc:AlternateContent xmlns:mc="http://schemas.openxmlformats.org/markup-compatibility/2006">
               <mc:Choice xmlns:v="urn:schemas-microsoft-com:vml" Requires="v">
-                <p:oleObj spid="_x0000_s74073" name="Equation" r:id="rId9" imgW="3009600" imgH="393480" progId="Equation.DSMT4">
+                <p:oleObj name="Equation" r:id="rId8" imgW="3009600" imgH="393480" progId="Equation.DSMT4">
                   <p:embed/>
                 </p:oleObj>
               </mc:Choice>
               <mc:Fallback>
-                <p:oleObj name="Equation" r:id="rId9" imgW="3009600" imgH="393480" progId="Equation.DSMT4">
+                <p:oleObj name="Equation" r:id="rId8" imgW="3009600" imgH="393480" progId="Equation.DSMT4">
                   <p:embed/>
                   <p:pic>
                     <p:nvPicPr>
@@ -21205,7 +21196,7 @@
                       <p:nvPr/>
                     </p:nvPicPr>
                     <p:blipFill>
-                      <a:blip r:embed="rId10"/>
+                      <a:blip r:embed="rId9"/>
                       <a:srcRect/>
                       <a:stretch>
                         <a:fillRect/>
@@ -21272,12 +21263,12 @@
           <a:graphicData uri="http://schemas.openxmlformats.org/presentationml/2006/ole">
             <mc:AlternateContent xmlns:mc="http://schemas.openxmlformats.org/markup-compatibility/2006">
               <mc:Choice xmlns:v="urn:schemas-microsoft-com:vml" Requires="v">
-                <p:oleObj spid="_x0000_s74074" name="Equation" r:id="rId11" imgW="2361960" imgH="368280" progId="Equation.DSMT4">
+                <p:oleObj name="Equation" r:id="rId10" imgW="2361960" imgH="368280" progId="Equation.DSMT4">
                   <p:embed/>
                 </p:oleObj>
               </mc:Choice>
               <mc:Fallback>
-                <p:oleObj name="Equation" r:id="rId11" imgW="2361960" imgH="368280" progId="Equation.DSMT4">
+                <p:oleObj name="Equation" r:id="rId10" imgW="2361960" imgH="368280" progId="Equation.DSMT4">
                   <p:embed/>
                   <p:pic>
                     <p:nvPicPr>
@@ -21288,7 +21279,7 @@
                       <p:nvPr/>
                     </p:nvPicPr>
                     <p:blipFill>
-                      <a:blip r:embed="rId12"/>
+                      <a:blip r:embed="rId11"/>
                       <a:srcRect/>
                       <a:stretch>
                         <a:fillRect/>
@@ -21306,7 +21297,6 @@
                       <a:ln>
                         <a:noFill/>
                       </a:ln>
-                      <a:extLst/>
                     </p:spPr>
                   </p:pic>
                 </p:oleObj>
@@ -21428,12 +21418,12 @@
           <a:graphicData uri="http://schemas.openxmlformats.org/presentationml/2006/ole">
             <mc:AlternateContent xmlns:mc="http://schemas.openxmlformats.org/markup-compatibility/2006">
               <mc:Choice xmlns:v="urn:schemas-microsoft-com:vml" Requires="v">
-                <p:oleObj spid="_x0000_s75132" name="Equation" r:id="rId3" imgW="4584600" imgH="469800" progId="Equation.DSMT4">
+                <p:oleObj name="Equation" r:id="rId2" imgW="4584600" imgH="469800" progId="Equation.DSMT4">
                   <p:embed/>
                 </p:oleObj>
               </mc:Choice>
               <mc:Fallback>
-                <p:oleObj name="Equation" r:id="rId3" imgW="4584600" imgH="469800" progId="Equation.DSMT4">
+                <p:oleObj name="Equation" r:id="rId2" imgW="4584600" imgH="469800" progId="Equation.DSMT4">
                   <p:embed/>
                   <p:pic>
                     <p:nvPicPr>
@@ -21444,7 +21434,7 @@
                       <p:nvPr/>
                     </p:nvPicPr>
                     <p:blipFill>
-                      <a:blip r:embed="rId4"/>
+                      <a:blip r:embed="rId3"/>
                       <a:srcRect/>
                       <a:stretch>
                         <a:fillRect/>
@@ -21676,12 +21666,12 @@
           <a:graphicData uri="http://schemas.openxmlformats.org/presentationml/2006/ole">
             <mc:AlternateContent xmlns:mc="http://schemas.openxmlformats.org/markup-compatibility/2006">
               <mc:Choice xmlns:v="urn:schemas-microsoft-com:vml" Requires="v">
-                <p:oleObj spid="_x0000_s75133" name="Equation" r:id="rId5" imgW="1688760" imgH="368280" progId="Equation.DSMT4">
+                <p:oleObj name="Equation" r:id="rId4" imgW="1688760" imgH="368280" progId="Equation.DSMT4">
                   <p:embed/>
                 </p:oleObj>
               </mc:Choice>
               <mc:Fallback>
-                <p:oleObj name="Equation" r:id="rId5" imgW="1688760" imgH="368280" progId="Equation.DSMT4">
+                <p:oleObj name="Equation" r:id="rId4" imgW="1688760" imgH="368280" progId="Equation.DSMT4">
                   <p:embed/>
                   <p:pic>
                     <p:nvPicPr>
@@ -21690,7 +21680,7 @@
                       <p:nvPr/>
                     </p:nvPicPr>
                     <p:blipFill>
-                      <a:blip r:embed="rId6"/>
+                      <a:blip r:embed="rId5"/>
                       <a:stretch>
                         <a:fillRect/>
                       </a:stretch>
@@ -21733,12 +21723,12 @@
           <a:graphicData uri="http://schemas.openxmlformats.org/presentationml/2006/ole">
             <mc:AlternateContent xmlns:mc="http://schemas.openxmlformats.org/markup-compatibility/2006">
               <mc:Choice xmlns:v="urn:schemas-microsoft-com:vml" Requires="v">
-                <p:oleObj spid="_x0000_s75134" name="Equation" r:id="rId7" imgW="1688760" imgH="368280" progId="Equation.DSMT4">
+                <p:oleObj name="Equation" r:id="rId6" imgW="1688760" imgH="368280" progId="Equation.DSMT4">
                   <p:embed/>
                 </p:oleObj>
               </mc:Choice>
               <mc:Fallback>
-                <p:oleObj name="Equation" r:id="rId7" imgW="1688760" imgH="368280" progId="Equation.DSMT4">
+                <p:oleObj name="Equation" r:id="rId6" imgW="1688760" imgH="368280" progId="Equation.DSMT4">
                   <p:embed/>
                   <p:pic>
                     <p:nvPicPr>
@@ -21747,7 +21737,7 @@
                       <p:nvPr/>
                     </p:nvPicPr>
                     <p:blipFill>
-                      <a:blip r:embed="rId8"/>
+                      <a:blip r:embed="rId7"/>
                       <a:stretch>
                         <a:fillRect/>
                       </a:stretch>
@@ -21955,12 +21945,12 @@
           <a:graphicData uri="http://schemas.openxmlformats.org/presentationml/2006/ole">
             <mc:AlternateContent xmlns:mc="http://schemas.openxmlformats.org/markup-compatibility/2006">
               <mc:Choice xmlns:v="urn:schemas-microsoft-com:vml" Requires="v">
-                <p:oleObj spid="_x0000_s75135" name="Equation" r:id="rId9" imgW="2031840" imgH="368280" progId="Equation.DSMT4">
+                <p:oleObj name="Equation" r:id="rId8" imgW="2031840" imgH="368280" progId="Equation.DSMT4">
                   <p:embed/>
                 </p:oleObj>
               </mc:Choice>
               <mc:Fallback>
-                <p:oleObj name="Equation" r:id="rId9" imgW="2031840" imgH="368280" progId="Equation.DSMT4">
+                <p:oleObj name="Equation" r:id="rId8" imgW="2031840" imgH="368280" progId="Equation.DSMT4">
                   <p:embed/>
                   <p:pic>
                     <p:nvPicPr>
@@ -21971,7 +21961,7 @@
                       <p:nvPr/>
                     </p:nvPicPr>
                     <p:blipFill>
-                      <a:blip r:embed="rId10"/>
+                      <a:blip r:embed="rId9"/>
                       <a:srcRect/>
                       <a:stretch>
                         <a:fillRect/>
@@ -22203,12 +22193,12 @@
           <a:graphicData uri="http://schemas.openxmlformats.org/presentationml/2006/ole">
             <mc:AlternateContent xmlns:mc="http://schemas.openxmlformats.org/markup-compatibility/2006">
               <mc:Choice xmlns:v="urn:schemas-microsoft-com:vml" Requires="v">
-                <p:oleObj spid="_x0000_s75136" name="Equation" r:id="rId11" imgW="2019240" imgH="368280" progId="Equation.DSMT4">
+                <p:oleObj name="Equation" r:id="rId10" imgW="2019240" imgH="368280" progId="Equation.DSMT4">
                   <p:embed/>
                 </p:oleObj>
               </mc:Choice>
               <mc:Fallback>
-                <p:oleObj name="Equation" r:id="rId11" imgW="2019240" imgH="368280" progId="Equation.DSMT4">
+                <p:oleObj name="Equation" r:id="rId10" imgW="2019240" imgH="368280" progId="Equation.DSMT4">
                   <p:embed/>
                   <p:pic>
                     <p:nvPicPr>
@@ -22219,7 +22209,7 @@
                       <p:nvPr/>
                     </p:nvPicPr>
                     <p:blipFill>
-                      <a:blip r:embed="rId12"/>
+                      <a:blip r:embed="rId11"/>
                       <a:srcRect/>
                       <a:stretch>
                         <a:fillRect/>
@@ -22286,12 +22276,12 @@
           <a:graphicData uri="http://schemas.openxmlformats.org/presentationml/2006/ole">
             <mc:AlternateContent xmlns:mc="http://schemas.openxmlformats.org/markup-compatibility/2006">
               <mc:Choice xmlns:v="urn:schemas-microsoft-com:vml" Requires="v">
-                <p:oleObj spid="_x0000_s75137" name="Equation" r:id="rId13" imgW="2120760" imgH="749160" progId="Equation.DSMT4">
+                <p:oleObj name="Equation" r:id="rId12" imgW="2120760" imgH="749160" progId="Equation.DSMT4">
                   <p:embed/>
                 </p:oleObj>
               </mc:Choice>
               <mc:Fallback>
-                <p:oleObj name="Equation" r:id="rId13" imgW="2120760" imgH="749160" progId="Equation.DSMT4">
+                <p:oleObj name="Equation" r:id="rId12" imgW="2120760" imgH="749160" progId="Equation.DSMT4">
                   <p:embed/>
                   <p:pic>
                     <p:nvPicPr>
@@ -22302,7 +22292,7 @@
                       <p:nvPr/>
                     </p:nvPicPr>
                     <p:blipFill>
-                      <a:blip r:embed="rId14"/>
+                      <a:blip r:embed="rId13"/>
                       <a:srcRect/>
                       <a:stretch>
                         <a:fillRect/>
@@ -22369,12 +22359,12 @@
           <a:graphicData uri="http://schemas.openxmlformats.org/presentationml/2006/ole">
             <mc:AlternateContent xmlns:mc="http://schemas.openxmlformats.org/markup-compatibility/2006">
               <mc:Choice xmlns:v="urn:schemas-microsoft-com:vml" Requires="v">
-                <p:oleObj spid="_x0000_s75138" name="Equation" r:id="rId15" imgW="2387520" imgH="368280" progId="Equation.DSMT4">
+                <p:oleObj name="Equation" r:id="rId14" imgW="2387520" imgH="368280" progId="Equation.DSMT4">
                   <p:embed/>
                 </p:oleObj>
               </mc:Choice>
               <mc:Fallback>
-                <p:oleObj name="Equation" r:id="rId15" imgW="2387520" imgH="368280" progId="Equation.DSMT4">
+                <p:oleObj name="Equation" r:id="rId14" imgW="2387520" imgH="368280" progId="Equation.DSMT4">
                   <p:embed/>
                   <p:pic>
                     <p:nvPicPr>
@@ -22385,7 +22375,7 @@
                       <p:nvPr/>
                     </p:nvPicPr>
                     <p:blipFill>
-                      <a:blip r:embed="rId16"/>
+                      <a:blip r:embed="rId15"/>
                       <a:srcRect/>
                       <a:stretch>
                         <a:fillRect/>
@@ -23894,12 +23884,12 @@
           <a:graphicData uri="http://schemas.openxmlformats.org/presentationml/2006/ole">
             <mc:AlternateContent xmlns:mc="http://schemas.openxmlformats.org/markup-compatibility/2006">
               <mc:Choice xmlns:v="urn:schemas-microsoft-com:vml" Requires="v">
-                <p:oleObj spid="_x0000_s76086" name="Equation" r:id="rId4" imgW="2031840" imgH="368280" progId="Equation.DSMT4">
+                <p:oleObj name="Equation" r:id="rId3" imgW="2031840" imgH="368280" progId="Equation.DSMT4">
                   <p:embed/>
                 </p:oleObj>
               </mc:Choice>
               <mc:Fallback>
-                <p:oleObj name="Equation" r:id="rId4" imgW="2031840" imgH="368280" progId="Equation.DSMT4">
+                <p:oleObj name="Equation" r:id="rId3" imgW="2031840" imgH="368280" progId="Equation.DSMT4">
                   <p:embed/>
                   <p:pic>
                     <p:nvPicPr>
@@ -23910,7 +23900,7 @@
                       <p:nvPr/>
                     </p:nvPicPr>
                     <p:blipFill>
-                      <a:blip r:embed="rId5"/>
+                      <a:blip r:embed="rId4"/>
                       <a:srcRect/>
                       <a:stretch>
                         <a:fillRect/>
@@ -23977,12 +23967,12 @@
           <a:graphicData uri="http://schemas.openxmlformats.org/presentationml/2006/ole">
             <mc:AlternateContent xmlns:mc="http://schemas.openxmlformats.org/markup-compatibility/2006">
               <mc:Choice xmlns:v="urn:schemas-microsoft-com:vml" Requires="v">
-                <p:oleObj spid="_x0000_s76087" name="Equation" r:id="rId6" imgW="3187440" imgH="368280" progId="Equation.DSMT4">
+                <p:oleObj name="Equation" r:id="rId5" imgW="3187440" imgH="368280" progId="Equation.DSMT4">
                   <p:embed/>
                 </p:oleObj>
               </mc:Choice>
               <mc:Fallback>
-                <p:oleObj name="Equation" r:id="rId6" imgW="3187440" imgH="368280" progId="Equation.DSMT4">
+                <p:oleObj name="Equation" r:id="rId5" imgW="3187440" imgH="368280" progId="Equation.DSMT4">
                   <p:embed/>
                   <p:pic>
                     <p:nvPicPr>
@@ -23991,7 +23981,7 @@
                       <p:nvPr/>
                     </p:nvPicPr>
                     <p:blipFill>
-                      <a:blip r:embed="rId7"/>
+                      <a:blip r:embed="rId6"/>
                       <a:stretch>
                         <a:fillRect/>
                       </a:stretch>
@@ -24034,12 +24024,12 @@
           <a:graphicData uri="http://schemas.openxmlformats.org/presentationml/2006/ole">
             <mc:AlternateContent xmlns:mc="http://schemas.openxmlformats.org/markup-compatibility/2006">
               <mc:Choice xmlns:v="urn:schemas-microsoft-com:vml" Requires="v">
-                <p:oleObj spid="_x0000_s76088" name="Equation" r:id="rId8" imgW="2425680" imgH="368280" progId="Equation.DSMT4">
+                <p:oleObj name="Equation" r:id="rId7" imgW="2425680" imgH="368280" progId="Equation.DSMT4">
                   <p:embed/>
                 </p:oleObj>
               </mc:Choice>
               <mc:Fallback>
-                <p:oleObj name="Equation" r:id="rId8" imgW="2425680" imgH="368280" progId="Equation.DSMT4">
+                <p:oleObj name="Equation" r:id="rId7" imgW="2425680" imgH="368280" progId="Equation.DSMT4">
                   <p:embed/>
                   <p:pic>
                     <p:nvPicPr>
@@ -24048,7 +24038,7 @@
                       <p:nvPr/>
                     </p:nvPicPr>
                     <p:blipFill>
-                      <a:blip r:embed="rId9"/>
+                      <a:blip r:embed="rId8"/>
                       <a:stretch>
                         <a:fillRect/>
                       </a:stretch>
@@ -24091,12 +24081,12 @@
           <a:graphicData uri="http://schemas.openxmlformats.org/presentationml/2006/ole">
             <mc:AlternateContent xmlns:mc="http://schemas.openxmlformats.org/markup-compatibility/2006">
               <mc:Choice xmlns:v="urn:schemas-microsoft-com:vml" Requires="v">
-                <p:oleObj spid="_x0000_s76089" name="Equation" r:id="rId10" imgW="2603160" imgH="368280" progId="Equation.DSMT4">
+                <p:oleObj name="Equation" r:id="rId9" imgW="2603160" imgH="368280" progId="Equation.DSMT4">
                   <p:embed/>
                 </p:oleObj>
               </mc:Choice>
               <mc:Fallback>
-                <p:oleObj name="Equation" r:id="rId10" imgW="2603160" imgH="368280" progId="Equation.DSMT4">
+                <p:oleObj name="Equation" r:id="rId9" imgW="2603160" imgH="368280" progId="Equation.DSMT4">
                   <p:embed/>
                   <p:pic>
                     <p:nvPicPr>
@@ -24105,7 +24095,7 @@
                       <p:nvPr/>
                     </p:nvPicPr>
                     <p:blipFill>
-                      <a:blip r:embed="rId11"/>
+                      <a:blip r:embed="rId10"/>
                       <a:stretch>
                         <a:fillRect/>
                       </a:stretch>
@@ -24148,12 +24138,12 @@
           <a:graphicData uri="http://schemas.openxmlformats.org/presentationml/2006/ole">
             <mc:AlternateContent xmlns:mc="http://schemas.openxmlformats.org/markup-compatibility/2006">
               <mc:Choice xmlns:v="urn:schemas-microsoft-com:vml" Requires="v">
-                <p:oleObj spid="_x0000_s76090" name="Equation" r:id="rId12" imgW="1180800" imgH="368280" progId="Equation.DSMT4">
+                <p:oleObj name="Equation" r:id="rId11" imgW="1180800" imgH="368280" progId="Equation.DSMT4">
                   <p:embed/>
                 </p:oleObj>
               </mc:Choice>
               <mc:Fallback>
-                <p:oleObj name="Equation" r:id="rId12" imgW="1180800" imgH="368280" progId="Equation.DSMT4">
+                <p:oleObj name="Equation" r:id="rId11" imgW="1180800" imgH="368280" progId="Equation.DSMT4">
                   <p:embed/>
                   <p:pic>
                     <p:nvPicPr>
@@ -24162,7 +24152,7 @@
                       <p:nvPr/>
                     </p:nvPicPr>
                     <p:blipFill>
-                      <a:blip r:embed="rId13"/>
+                      <a:blip r:embed="rId12"/>
                       <a:stretch>
                         <a:fillRect/>
                       </a:stretch>
@@ -24205,12 +24195,12 @@
           <a:graphicData uri="http://schemas.openxmlformats.org/presentationml/2006/ole">
             <mc:AlternateContent xmlns:mc="http://schemas.openxmlformats.org/markup-compatibility/2006">
               <mc:Choice xmlns:v="urn:schemas-microsoft-com:vml" Requires="v">
-                <p:oleObj spid="_x0000_s76091" name="Equation" r:id="rId14" imgW="2489040" imgH="749160" progId="Equation.DSMT4">
+                <p:oleObj name="Equation" r:id="rId13" imgW="2489040" imgH="749160" progId="Equation.DSMT4">
                   <p:embed/>
                 </p:oleObj>
               </mc:Choice>
               <mc:Fallback>
-                <p:oleObj name="Equation" r:id="rId14" imgW="2489040" imgH="749160" progId="Equation.DSMT4">
+                <p:oleObj name="Equation" r:id="rId13" imgW="2489040" imgH="749160" progId="Equation.DSMT4">
                   <p:embed/>
                   <p:pic>
                     <p:nvPicPr>
@@ -24219,7 +24209,7 @@
                       <p:nvPr/>
                     </p:nvPicPr>
                     <p:blipFill>
-                      <a:blip r:embed="rId15"/>
+                      <a:blip r:embed="rId14"/>
                       <a:stretch>
                         <a:fillRect/>
                       </a:stretch>
@@ -24572,12 +24562,12 @@
           <a:graphicData uri="http://schemas.openxmlformats.org/presentationml/2006/ole">
             <mc:AlternateContent xmlns:mc="http://schemas.openxmlformats.org/markup-compatibility/2006">
               <mc:Choice xmlns:v="urn:schemas-microsoft-com:vml" Requires="v">
-                <p:oleObj spid="_x0000_s76994" name="Equation" r:id="rId3" imgW="2031840" imgH="393480" progId="Equation.DSMT4">
+                <p:oleObj name="Equation" r:id="rId2" imgW="2031840" imgH="393480" progId="Equation.DSMT4">
                   <p:embed/>
                 </p:oleObj>
               </mc:Choice>
               <mc:Fallback>
-                <p:oleObj name="Equation" r:id="rId3" imgW="2031840" imgH="393480" progId="Equation.DSMT4">
+                <p:oleObj name="Equation" r:id="rId2" imgW="2031840" imgH="393480" progId="Equation.DSMT4">
                   <p:embed/>
                   <p:pic>
                     <p:nvPicPr>
@@ -24588,7 +24578,7 @@
                       <p:nvPr/>
                     </p:nvPicPr>
                     <p:blipFill>
-                      <a:blip r:embed="rId4"/>
+                      <a:blip r:embed="rId3"/>
                       <a:srcRect/>
                       <a:stretch>
                         <a:fillRect/>
@@ -24629,7 +24619,7 @@
           <p:nvPr/>
         </p:nvPicPr>
         <p:blipFill>
-          <a:blip r:embed="rId5"/>
+          <a:blip r:embed="rId4"/>
           <a:stretch>
             <a:fillRect/>
           </a:stretch>
@@ -24697,12 +24687,12 @@
           <a:graphicData uri="http://schemas.openxmlformats.org/presentationml/2006/ole">
             <mc:AlternateContent xmlns:mc="http://schemas.openxmlformats.org/markup-compatibility/2006">
               <mc:Choice xmlns:v="urn:schemas-microsoft-com:vml" Requires="v">
-                <p:oleObj spid="_x0000_s76995" name="Equation" r:id="rId6" imgW="1574640" imgH="622080" progId="Equation.DSMT4">
+                <p:oleObj name="Equation" r:id="rId5" imgW="1574640" imgH="622080" progId="Equation.DSMT4">
                   <p:embed/>
                 </p:oleObj>
               </mc:Choice>
               <mc:Fallback>
-                <p:oleObj name="Equation" r:id="rId6" imgW="1574640" imgH="622080" progId="Equation.DSMT4">
+                <p:oleObj name="Equation" r:id="rId5" imgW="1574640" imgH="622080" progId="Equation.DSMT4">
                   <p:embed/>
                   <p:pic>
                     <p:nvPicPr>
@@ -24713,7 +24703,7 @@
                       <p:nvPr/>
                     </p:nvPicPr>
                     <p:blipFill>
-                      <a:blip r:embed="rId7"/>
+                      <a:blip r:embed="rId6"/>
                       <a:srcRect/>
                       <a:stretch>
                         <a:fillRect/>
@@ -24882,12 +24872,12 @@
           <a:graphicData uri="http://schemas.openxmlformats.org/presentationml/2006/ole">
             <mc:AlternateContent xmlns:mc="http://schemas.openxmlformats.org/markup-compatibility/2006">
               <mc:Choice xmlns:v="urn:schemas-microsoft-com:vml" Requires="v">
-                <p:oleObj spid="_x0000_s76996" name="Equation" r:id="rId8" imgW="939600" imgH="393480" progId="Equation.DSMT4">
+                <p:oleObj name="Equation" r:id="rId7" imgW="939600" imgH="393480" progId="Equation.DSMT4">
                   <p:embed/>
                 </p:oleObj>
               </mc:Choice>
               <mc:Fallback>
-                <p:oleObj name="Equation" r:id="rId8" imgW="939600" imgH="393480" progId="Equation.DSMT4">
+                <p:oleObj name="Equation" r:id="rId7" imgW="939600" imgH="393480" progId="Equation.DSMT4">
                   <p:embed/>
                   <p:pic>
                     <p:nvPicPr>
@@ -24898,7 +24888,7 @@
                       <p:nvPr/>
                     </p:nvPicPr>
                     <p:blipFill>
-                      <a:blip r:embed="rId9"/>
+                      <a:blip r:embed="rId8"/>
                       <a:srcRect/>
                       <a:stretch>
                         <a:fillRect/>
@@ -24983,12 +24973,12 @@
           <a:graphicData uri="http://schemas.openxmlformats.org/presentationml/2006/ole">
             <mc:AlternateContent xmlns:mc="http://schemas.openxmlformats.org/markup-compatibility/2006">
               <mc:Choice xmlns:v="urn:schemas-microsoft-com:vml" Requires="v">
-                <p:oleObj spid="_x0000_s76997" name="Equation" r:id="rId10" imgW="4228920" imgH="799920" progId="Equation.DSMT4">
+                <p:oleObj name="Equation" r:id="rId9" imgW="4228920" imgH="799920" progId="Equation.DSMT4">
                   <p:embed/>
                 </p:oleObj>
               </mc:Choice>
               <mc:Fallback>
-                <p:oleObj name="Equation" r:id="rId10" imgW="4228920" imgH="799920" progId="Equation.DSMT4">
+                <p:oleObj name="Equation" r:id="rId9" imgW="4228920" imgH="799920" progId="Equation.DSMT4">
                   <p:embed/>
                   <p:pic>
                     <p:nvPicPr>
@@ -24999,7 +24989,7 @@
                       <p:nvPr/>
                     </p:nvPicPr>
                     <p:blipFill>
-                      <a:blip r:embed="rId11"/>
+                      <a:blip r:embed="rId10"/>
                       <a:srcRect/>
                       <a:stretch>
                         <a:fillRect/>
@@ -25468,7 +25458,7 @@
           <p:nvPr/>
         </p:nvPicPr>
         <p:blipFill>
-          <a:blip r:embed="rId3"/>
+          <a:blip r:embed="rId2"/>
           <a:stretch>
             <a:fillRect/>
           </a:stretch>
@@ -25492,7 +25482,7 @@
           <p:nvPr/>
         </p:nvPicPr>
         <p:blipFill>
-          <a:blip r:embed="rId4"/>
+          <a:blip r:embed="rId3"/>
           <a:stretch>
             <a:fillRect/>
           </a:stretch>
@@ -25529,12 +25519,12 @@
           <a:graphicData uri="http://schemas.openxmlformats.org/presentationml/2006/ole">
             <mc:AlternateContent xmlns:mc="http://schemas.openxmlformats.org/markup-compatibility/2006">
               <mc:Choice xmlns:v="urn:schemas-microsoft-com:vml" Requires="v">
-                <p:oleObj spid="_x0000_s77873" name="Equation" r:id="rId5" imgW="3047760" imgH="393480" progId="Equation.DSMT4">
+                <p:oleObj name="Equation" r:id="rId4" imgW="3047760" imgH="393480" progId="Equation.DSMT4">
                   <p:embed/>
                 </p:oleObj>
               </mc:Choice>
               <mc:Fallback>
-                <p:oleObj name="Equation" r:id="rId5" imgW="3047760" imgH="393480" progId="Equation.DSMT4">
+                <p:oleObj name="Equation" r:id="rId4" imgW="3047760" imgH="393480" progId="Equation.DSMT4">
                   <p:embed/>
                   <p:pic>
                     <p:nvPicPr>
@@ -25545,7 +25535,7 @@
                       <p:nvPr/>
                     </p:nvPicPr>
                     <p:blipFill>
-                      <a:blip r:embed="rId6"/>
+                      <a:blip r:embed="rId5"/>
                       <a:srcRect/>
                       <a:stretch>
                         <a:fillRect/>
@@ -25641,9 +25631,7 @@
           <p:cNvGraphicFramePr>
             <a:graphicFrameLocks noChangeAspect="1"/>
           </p:cNvGraphicFramePr>
-          <p:nvPr>
-            <p:extLst/>
-          </p:nvPr>
+          <p:nvPr/>
         </p:nvGraphicFramePr>
         <p:xfrm>
           <a:off x="1378407" y="822338"/>
@@ -25653,12 +25641,12 @@
           <a:graphicData uri="http://schemas.openxmlformats.org/presentationml/2006/ole">
             <mc:AlternateContent xmlns:mc="http://schemas.openxmlformats.org/markup-compatibility/2006">
               <mc:Choice xmlns:v="urn:schemas-microsoft-com:vml" Requires="v">
-                <p:oleObj spid="_x0000_s78988" name="Equation" r:id="rId4" imgW="2031840" imgH="368280" progId="Equation.DSMT4">
+                <p:oleObj name="Equation" r:id="rId3" imgW="2031840" imgH="368280" progId="Equation.DSMT4">
                   <p:embed/>
                 </p:oleObj>
               </mc:Choice>
               <mc:Fallback>
-                <p:oleObj name="Equation" r:id="rId4" imgW="2031840" imgH="368280" progId="Equation.DSMT4">
+                <p:oleObj name="Equation" r:id="rId3" imgW="2031840" imgH="368280" progId="Equation.DSMT4">
                   <p:embed/>
                   <p:pic>
                     <p:nvPicPr>
@@ -25669,7 +25657,7 @@
                       <p:nvPr/>
                     </p:nvPicPr>
                     <p:blipFill>
-                      <a:blip r:embed="rId5"/>
+                      <a:blip r:embed="rId4"/>
                       <a:srcRect/>
                       <a:stretch>
                         <a:fillRect/>
@@ -25736,12 +25724,12 @@
           <a:graphicData uri="http://schemas.openxmlformats.org/presentationml/2006/ole">
             <mc:AlternateContent xmlns:mc="http://schemas.openxmlformats.org/markup-compatibility/2006">
               <mc:Choice xmlns:v="urn:schemas-microsoft-com:vml" Requires="v">
-                <p:oleObj spid="_x0000_s78989" name="Equation" r:id="rId6" imgW="2412720" imgH="368280" progId="Equation.DSMT4">
+                <p:oleObj name="Equation" r:id="rId5" imgW="2412720" imgH="368280" progId="Equation.DSMT4">
                   <p:embed/>
                 </p:oleObj>
               </mc:Choice>
               <mc:Fallback>
-                <p:oleObj name="Equation" r:id="rId6" imgW="2412720" imgH="368280" progId="Equation.DSMT4">
+                <p:oleObj name="Equation" r:id="rId5" imgW="2412720" imgH="368280" progId="Equation.DSMT4">
                   <p:embed/>
                   <p:pic>
                     <p:nvPicPr>
@@ -25750,7 +25738,7 @@
                       <p:nvPr/>
                     </p:nvPicPr>
                     <p:blipFill>
-                      <a:blip r:embed="rId7"/>
+                      <a:blip r:embed="rId6"/>
                       <a:stretch>
                         <a:fillRect/>
                       </a:stretch>
@@ -25850,12 +25838,12 @@
           <a:graphicData uri="http://schemas.openxmlformats.org/presentationml/2006/ole">
             <mc:AlternateContent xmlns:mc="http://schemas.openxmlformats.org/markup-compatibility/2006">
               <mc:Choice xmlns:v="urn:schemas-microsoft-com:vml" Requires="v">
-                <p:oleObj spid="_x0000_s78990" name="Equation" r:id="rId8" imgW="2590560" imgH="749160" progId="Equation.DSMT4">
+                <p:oleObj name="Equation" r:id="rId7" imgW="2590560" imgH="749160" progId="Equation.DSMT4">
                   <p:embed/>
                 </p:oleObj>
               </mc:Choice>
               <mc:Fallback>
-                <p:oleObj name="Equation" r:id="rId8" imgW="2590560" imgH="749160" progId="Equation.DSMT4">
+                <p:oleObj name="Equation" r:id="rId7" imgW="2590560" imgH="749160" progId="Equation.DSMT4">
                   <p:embed/>
                   <p:pic>
                     <p:nvPicPr>
@@ -25864,7 +25852,7 @@
                       <p:nvPr/>
                     </p:nvPicPr>
                     <p:blipFill>
-                      <a:blip r:embed="rId9"/>
+                      <a:blip r:embed="rId8"/>
                       <a:stretch>
                         <a:fillRect/>
                       </a:stretch>
@@ -26579,9 +26567,7 @@
           <p:cNvGraphicFramePr>
             <a:graphicFrameLocks noChangeAspect="1"/>
           </p:cNvGraphicFramePr>
-          <p:nvPr>
-            <p:extLst/>
-          </p:nvPr>
+          <p:nvPr/>
         </p:nvGraphicFramePr>
         <p:xfrm>
           <a:off x="1025398" y="3094655"/>
@@ -26591,12 +26577,12 @@
           <a:graphicData uri="http://schemas.openxmlformats.org/presentationml/2006/ole">
             <mc:AlternateContent xmlns:mc="http://schemas.openxmlformats.org/markup-compatibility/2006">
               <mc:Choice xmlns:v="urn:schemas-microsoft-com:vml" Requires="v">
-                <p:oleObj spid="_x0000_s79918" name="Equation" r:id="rId3" imgW="6235700" imgH="736600" progId="Equation.DSMT4">
+                <p:oleObj name="Equation" r:id="rId2" imgW="6235700" imgH="736600" progId="Equation.DSMT4">
                   <p:embed/>
                 </p:oleObj>
               </mc:Choice>
               <mc:Fallback>
-                <p:oleObj name="Equation" r:id="rId3" imgW="6235700" imgH="736600" progId="Equation.DSMT4">
+                <p:oleObj name="Equation" r:id="rId2" imgW="6235700" imgH="736600" progId="Equation.DSMT4">
                   <p:embed/>
                   <p:pic>
                     <p:nvPicPr>
@@ -26607,7 +26593,7 @@
                       <p:nvPr/>
                     </p:nvPicPr>
                     <p:blipFill>
-                      <a:blip r:embed="rId4">
+                      <a:blip r:embed="rId3">
                         <a:extLst>
                           <a:ext uri="{28A0092B-C50C-407E-A947-70E740481C1C}">
                             <a14:useLocalDpi xmlns:a14="http://schemas.microsoft.com/office/drawing/2010/main" val="0"/>
@@ -27050,9 +27036,7 @@
           <p:cNvGraphicFramePr>
             <a:graphicFrameLocks noChangeAspect="1"/>
           </p:cNvGraphicFramePr>
-          <p:nvPr>
-            <p:extLst/>
-          </p:nvPr>
+          <p:nvPr/>
         </p:nvGraphicFramePr>
         <p:xfrm>
           <a:off x="1720342" y="2291471"/>
@@ -27062,12 +27046,12 @@
           <a:graphicData uri="http://schemas.openxmlformats.org/presentationml/2006/ole">
             <mc:AlternateContent xmlns:mc="http://schemas.openxmlformats.org/markup-compatibility/2006">
               <mc:Choice xmlns:v="urn:schemas-microsoft-com:vml" Requires="v">
-                <p:oleObj spid="_x0000_s80942" name="Equation" r:id="rId3" imgW="6324600" imgH="736600" progId="Equation.DSMT4">
+                <p:oleObj name="Equation" r:id="rId2" imgW="6324600" imgH="736600" progId="Equation.DSMT4">
                   <p:embed/>
                 </p:oleObj>
               </mc:Choice>
               <mc:Fallback>
-                <p:oleObj name="Equation" r:id="rId3" imgW="6324600" imgH="736600" progId="Equation.DSMT4">
+                <p:oleObj name="Equation" r:id="rId2" imgW="6324600" imgH="736600" progId="Equation.DSMT4">
                   <p:embed/>
                   <p:pic>
                     <p:nvPicPr>
@@ -27078,7 +27062,7 @@
                       <p:nvPr/>
                     </p:nvPicPr>
                     <p:blipFill>
-                      <a:blip r:embed="rId4">
+                      <a:blip r:embed="rId3">
                         <a:extLst>
                           <a:ext uri="{28A0092B-C50C-407E-A947-70E740481C1C}">
                             <a14:useLocalDpi xmlns:a14="http://schemas.microsoft.com/office/drawing/2010/main" val="0"/>
@@ -27502,12 +27486,12 @@
           <a:graphicData uri="http://schemas.openxmlformats.org/presentationml/2006/ole">
             <mc:AlternateContent xmlns:mc="http://schemas.openxmlformats.org/markup-compatibility/2006">
               <mc:Choice xmlns:v="urn:schemas-microsoft-com:vml" Requires="v">
-                <p:oleObj spid="_x0000_s81966" name="Equation" r:id="rId4" imgW="2095500" imgH="381000" progId="Equation.DSMT4">
+                <p:oleObj name="Equation" r:id="rId3" imgW="2095500" imgH="381000" progId="Equation.DSMT4">
                   <p:embed/>
                 </p:oleObj>
               </mc:Choice>
               <mc:Fallback>
-                <p:oleObj name="Equation" r:id="rId4" imgW="2095500" imgH="381000" progId="Equation.DSMT4">
+                <p:oleObj name="Equation" r:id="rId3" imgW="2095500" imgH="381000" progId="Equation.DSMT4">
                   <p:embed/>
                   <p:pic>
                     <p:nvPicPr>
@@ -27518,7 +27502,7 @@
                       <p:nvPr/>
                     </p:nvPicPr>
                     <p:blipFill>
-                      <a:blip r:embed="rId5">
+                      <a:blip r:embed="rId4">
                         <a:extLst>
                           <a:ext uri="{28A0092B-C50C-407E-A947-70E740481C1C}">
                             <a14:useLocalDpi xmlns:a14="http://schemas.microsoft.com/office/drawing/2010/main" val="0"/>
@@ -27588,7 +27572,7 @@
           <p:nvPr/>
         </p:nvPicPr>
         <p:blipFill>
-          <a:blip r:embed="rId6">
+          <a:blip r:embed="rId5">
             <a:extLst>
               <a:ext uri="{28A0092B-C50C-407E-A947-70E740481C1C}">
                 <a14:useLocalDpi xmlns:a14="http://schemas.microsoft.com/office/drawing/2010/main" val="0"/>
@@ -28437,12 +28421,12 @@
           <a:graphicData uri="http://schemas.openxmlformats.org/presentationml/2006/ole">
             <mc:AlternateContent xmlns:mc="http://schemas.openxmlformats.org/markup-compatibility/2006">
               <mc:Choice xmlns:v="urn:schemas-microsoft-com:vml" Requires="v">
-                <p:oleObj spid="_x0000_s92306" name="Equation" r:id="rId3" imgW="2933700" imgH="1549400" progId="Equation.DSMT4">
+                <p:oleObj name="Equation" r:id="rId2" imgW="2933700" imgH="1549400" progId="Equation.DSMT4">
                   <p:embed/>
                 </p:oleObj>
               </mc:Choice>
               <mc:Fallback>
-                <p:oleObj name="Equation" r:id="rId3" imgW="2933700" imgH="1549400" progId="Equation.DSMT4">
+                <p:oleObj name="Equation" r:id="rId2" imgW="2933700" imgH="1549400" progId="Equation.DSMT4">
                   <p:embed/>
                   <p:pic>
                     <p:nvPicPr>
@@ -28453,7 +28437,7 @@
                       <p:nvPr/>
                     </p:nvPicPr>
                     <p:blipFill>
-                      <a:blip r:embed="rId4">
+                      <a:blip r:embed="rId3">
                         <a:extLst>
                           <a:ext uri="{28A0092B-C50C-407E-A947-70E740481C1C}">
                             <a14:useLocalDpi xmlns:a14="http://schemas.microsoft.com/office/drawing/2010/main" val="0"/>
@@ -28684,12 +28668,12 @@
           <a:graphicData uri="http://schemas.openxmlformats.org/presentationml/2006/ole">
             <mc:AlternateContent xmlns:mc="http://schemas.openxmlformats.org/markup-compatibility/2006">
               <mc:Choice xmlns:v="urn:schemas-microsoft-com:vml" Requires="v">
-                <p:oleObj spid="_x0000_s92307" name="Equation" r:id="rId5" imgW="1485900" imgH="736600" progId="Equation.DSMT4">
+                <p:oleObj name="Equation" r:id="rId4" imgW="1485900" imgH="736600" progId="Equation.DSMT4">
                   <p:embed/>
                 </p:oleObj>
               </mc:Choice>
               <mc:Fallback>
-                <p:oleObj name="Equation" r:id="rId5" imgW="1485900" imgH="736600" progId="Equation.DSMT4">
+                <p:oleObj name="Equation" r:id="rId4" imgW="1485900" imgH="736600" progId="Equation.DSMT4">
                   <p:embed/>
                   <p:pic>
                     <p:nvPicPr>
@@ -28700,7 +28684,7 @@
                       <p:nvPr/>
                     </p:nvPicPr>
                     <p:blipFill>
-                      <a:blip r:embed="rId6">
+                      <a:blip r:embed="rId5">
                         <a:extLst>
                           <a:ext uri="{28A0092B-C50C-407E-A947-70E740481C1C}">
                             <a14:useLocalDpi xmlns:a14="http://schemas.microsoft.com/office/drawing/2010/main" val="0"/>
@@ -28777,12 +28761,12 @@
           <a:graphicData uri="http://schemas.openxmlformats.org/presentationml/2006/ole">
             <mc:AlternateContent xmlns:mc="http://schemas.openxmlformats.org/markup-compatibility/2006">
               <mc:Choice xmlns:v="urn:schemas-microsoft-com:vml" Requires="v">
-                <p:oleObj spid="_x0000_s92308" name="Equation" r:id="rId7" imgW="888614" imgH="355446" progId="Equation.DSMT4">
+                <p:oleObj name="Equation" r:id="rId6" imgW="888614" imgH="355446" progId="Equation.DSMT4">
                   <p:embed/>
                 </p:oleObj>
               </mc:Choice>
               <mc:Fallback>
-                <p:oleObj name="Equation" r:id="rId7" imgW="888614" imgH="355446" progId="Equation.DSMT4">
+                <p:oleObj name="Equation" r:id="rId6" imgW="888614" imgH="355446" progId="Equation.DSMT4">
                   <p:embed/>
                   <p:pic>
                     <p:nvPicPr>
@@ -28793,7 +28777,7 @@
                       <p:nvPr/>
                     </p:nvPicPr>
                     <p:blipFill>
-                      <a:blip r:embed="rId8">
+                      <a:blip r:embed="rId7">
                         <a:extLst>
                           <a:ext uri="{28A0092B-C50C-407E-A947-70E740481C1C}">
                             <a14:useLocalDpi xmlns:a14="http://schemas.microsoft.com/office/drawing/2010/main" val="0"/>
@@ -29024,12 +29008,12 @@
           <a:graphicData uri="http://schemas.openxmlformats.org/presentationml/2006/ole">
             <mc:AlternateContent xmlns:mc="http://schemas.openxmlformats.org/markup-compatibility/2006">
               <mc:Choice xmlns:v="urn:schemas-microsoft-com:vml" Requires="v">
-                <p:oleObj spid="_x0000_s92309" name="Equation" r:id="rId9" imgW="1485900" imgH="736600" progId="Equation.DSMT4">
+                <p:oleObj name="Equation" r:id="rId8" imgW="1485900" imgH="736600" progId="Equation.DSMT4">
                   <p:embed/>
                 </p:oleObj>
               </mc:Choice>
               <mc:Fallback>
-                <p:oleObj name="Equation" r:id="rId9" imgW="1485900" imgH="736600" progId="Equation.DSMT4">
+                <p:oleObj name="Equation" r:id="rId8" imgW="1485900" imgH="736600" progId="Equation.DSMT4">
                   <p:embed/>
                   <p:pic>
                     <p:nvPicPr>
@@ -29040,7 +29024,7 @@
                       <p:nvPr/>
                     </p:nvPicPr>
                     <p:blipFill>
-                      <a:blip r:embed="rId10">
+                      <a:blip r:embed="rId9">
                         <a:extLst>
                           <a:ext uri="{28A0092B-C50C-407E-A947-70E740481C1C}">
                             <a14:useLocalDpi xmlns:a14="http://schemas.microsoft.com/office/drawing/2010/main" val="0"/>
@@ -29454,12 +29438,12 @@
           <a:graphicData uri="http://schemas.openxmlformats.org/presentationml/2006/ole">
             <mc:AlternateContent xmlns:mc="http://schemas.openxmlformats.org/markup-compatibility/2006">
               <mc:Choice xmlns:v="urn:schemas-microsoft-com:vml" Requires="v">
-                <p:oleObj spid="_x0000_s92310" name="Equation" r:id="rId11" imgW="4508500" imgH="1549400" progId="Equation.DSMT4">
+                <p:oleObj name="Equation" r:id="rId10" imgW="4508500" imgH="1549400" progId="Equation.DSMT4">
                   <p:embed/>
                 </p:oleObj>
               </mc:Choice>
               <mc:Fallback>
-                <p:oleObj name="Equation" r:id="rId11" imgW="4508500" imgH="1549400" progId="Equation.DSMT4">
+                <p:oleObj name="Equation" r:id="rId10" imgW="4508500" imgH="1549400" progId="Equation.DSMT4">
                   <p:embed/>
                   <p:pic>
                     <p:nvPicPr>
@@ -29470,7 +29454,7 @@
                       <p:nvPr/>
                     </p:nvPicPr>
                     <p:blipFill>
-                      <a:blip r:embed="rId12">
+                      <a:blip r:embed="rId11">
                         <a:extLst>
                           <a:ext uri="{28A0092B-C50C-407E-A947-70E740481C1C}">
                             <a14:useLocalDpi xmlns:a14="http://schemas.microsoft.com/office/drawing/2010/main" val="0"/>
@@ -29701,12 +29685,12 @@
           <a:graphicData uri="http://schemas.openxmlformats.org/presentationml/2006/ole">
             <mc:AlternateContent xmlns:mc="http://schemas.openxmlformats.org/markup-compatibility/2006">
               <mc:Choice xmlns:v="urn:schemas-microsoft-com:vml" Requires="v">
-                <p:oleObj spid="_x0000_s92311" name="Equation" r:id="rId13" imgW="2247900" imgH="736600" progId="Equation.DSMT4">
+                <p:oleObj name="Equation" r:id="rId12" imgW="2247900" imgH="736600" progId="Equation.DSMT4">
                   <p:embed/>
                 </p:oleObj>
               </mc:Choice>
               <mc:Fallback>
-                <p:oleObj name="Equation" r:id="rId13" imgW="2247900" imgH="736600" progId="Equation.DSMT4">
+                <p:oleObj name="Equation" r:id="rId12" imgW="2247900" imgH="736600" progId="Equation.DSMT4">
                   <p:embed/>
                   <p:pic>
                     <p:nvPicPr>
@@ -29717,7 +29701,7 @@
                       <p:nvPr/>
                     </p:nvPicPr>
                     <p:blipFill>
-                      <a:blip r:embed="rId14">
+                      <a:blip r:embed="rId13">
                         <a:extLst>
                           <a:ext uri="{28A0092B-C50C-407E-A947-70E740481C1C}">
                             <a14:useLocalDpi xmlns:a14="http://schemas.microsoft.com/office/drawing/2010/main" val="0"/>
@@ -29794,12 +29778,12 @@
           <a:graphicData uri="http://schemas.openxmlformats.org/presentationml/2006/ole">
             <mc:AlternateContent xmlns:mc="http://schemas.openxmlformats.org/markup-compatibility/2006">
               <mc:Choice xmlns:v="urn:schemas-microsoft-com:vml" Requires="v">
-                <p:oleObj spid="_x0000_s92312" name="Equation" r:id="rId15" imgW="1155199" imgH="355446" progId="Equation.DSMT4">
+                <p:oleObj name="Equation" r:id="rId14" imgW="1155199" imgH="355446" progId="Equation.DSMT4">
                   <p:embed/>
                 </p:oleObj>
               </mc:Choice>
               <mc:Fallback>
-                <p:oleObj name="Equation" r:id="rId15" imgW="1155199" imgH="355446" progId="Equation.DSMT4">
+                <p:oleObj name="Equation" r:id="rId14" imgW="1155199" imgH="355446" progId="Equation.DSMT4">
                   <p:embed/>
                   <p:pic>
                     <p:nvPicPr>
@@ -29810,7 +29794,7 @@
                       <p:nvPr/>
                     </p:nvPicPr>
                     <p:blipFill>
-                      <a:blip r:embed="rId16">
+                      <a:blip r:embed="rId15">
                         <a:extLst>
                           <a:ext uri="{28A0092B-C50C-407E-A947-70E740481C1C}">
                             <a14:useLocalDpi xmlns:a14="http://schemas.microsoft.com/office/drawing/2010/main" val="0"/>
@@ -30041,12 +30025,12 @@
           <a:graphicData uri="http://schemas.openxmlformats.org/presentationml/2006/ole">
             <mc:AlternateContent xmlns:mc="http://schemas.openxmlformats.org/markup-compatibility/2006">
               <mc:Choice xmlns:v="urn:schemas-microsoft-com:vml" Requires="v">
-                <p:oleObj spid="_x0000_s92313" name="Equation" r:id="rId17" imgW="2247900" imgH="736600" progId="Equation.DSMT4">
+                <p:oleObj name="Equation" r:id="rId16" imgW="2247900" imgH="736600" progId="Equation.DSMT4">
                   <p:embed/>
                 </p:oleObj>
               </mc:Choice>
               <mc:Fallback>
-                <p:oleObj name="Equation" r:id="rId17" imgW="2247900" imgH="736600" progId="Equation.DSMT4">
+                <p:oleObj name="Equation" r:id="rId16" imgW="2247900" imgH="736600" progId="Equation.DSMT4">
                   <p:embed/>
                   <p:pic>
                     <p:nvPicPr>
@@ -30057,7 +30041,7 @@
                       <p:nvPr/>
                     </p:nvPicPr>
                     <p:blipFill>
-                      <a:blip r:embed="rId18">
+                      <a:blip r:embed="rId17">
                         <a:extLst>
                           <a:ext uri="{28A0092B-C50C-407E-A947-70E740481C1C}">
                             <a14:useLocalDpi xmlns:a14="http://schemas.microsoft.com/office/drawing/2010/main" val="0"/>
@@ -31020,12 +31004,12 @@
           <a:graphicData uri="http://schemas.openxmlformats.org/presentationml/2006/ole">
             <mc:AlternateContent xmlns:mc="http://schemas.openxmlformats.org/markup-compatibility/2006">
               <mc:Choice xmlns:v="urn:schemas-microsoft-com:vml" Requires="v">
-                <p:oleObj spid="_x0000_s93294" name="Equation" r:id="rId3" imgW="3720960" imgH="1549080" progId="Equation.DSMT4">
+                <p:oleObj name="Equation" r:id="rId2" imgW="3720960" imgH="1549080" progId="Equation.DSMT4">
                   <p:embed/>
                 </p:oleObj>
               </mc:Choice>
               <mc:Fallback>
-                <p:oleObj name="Equation" r:id="rId3" imgW="3720960" imgH="1549080" progId="Equation.DSMT4">
+                <p:oleObj name="Equation" r:id="rId2" imgW="3720960" imgH="1549080" progId="Equation.DSMT4">
                   <p:embed/>
                   <p:pic>
                     <p:nvPicPr>
@@ -31036,7 +31020,7 @@
                       <p:nvPr/>
                     </p:nvPicPr>
                     <p:blipFill>
-                      <a:blip r:embed="rId4"/>
+                      <a:blip r:embed="rId3"/>
                       <a:srcRect/>
                       <a:stretch>
                         <a:fillRect/>
@@ -31267,12 +31251,12 @@
           <a:graphicData uri="http://schemas.openxmlformats.org/presentationml/2006/ole">
             <mc:AlternateContent xmlns:mc="http://schemas.openxmlformats.org/markup-compatibility/2006">
               <mc:Choice xmlns:v="urn:schemas-microsoft-com:vml" Requires="v">
-                <p:oleObj spid="_x0000_s93295" name="Equation" r:id="rId5" imgW="2222280" imgH="736560" progId="Equation.DSMT4">
+                <p:oleObj name="Equation" r:id="rId4" imgW="2222280" imgH="736560" progId="Equation.DSMT4">
                   <p:embed/>
                 </p:oleObj>
               </mc:Choice>
               <mc:Fallback>
-                <p:oleObj name="Equation" r:id="rId5" imgW="2222280" imgH="736560" progId="Equation.DSMT4">
+                <p:oleObj name="Equation" r:id="rId4" imgW="2222280" imgH="736560" progId="Equation.DSMT4">
                   <p:embed/>
                   <p:pic>
                     <p:nvPicPr>
@@ -31283,7 +31267,7 @@
                       <p:nvPr/>
                     </p:nvPicPr>
                     <p:blipFill>
-                      <a:blip r:embed="rId6"/>
+                      <a:blip r:embed="rId5"/>
                       <a:srcRect/>
                       <a:stretch>
                         <a:fillRect/>
@@ -31344,9 +31328,7 @@
           <p:cNvGraphicFramePr>
             <a:graphicFrameLocks noChangeAspect="1"/>
           </p:cNvGraphicFramePr>
-          <p:nvPr>
-            <p:extLst/>
-          </p:nvPr>
+          <p:nvPr/>
         </p:nvGraphicFramePr>
         <p:xfrm>
           <a:off x="2465526" y="2854466"/>
@@ -31356,12 +31338,12 @@
           <a:graphicData uri="http://schemas.openxmlformats.org/presentationml/2006/ole">
             <mc:AlternateContent xmlns:mc="http://schemas.openxmlformats.org/markup-compatibility/2006">
               <mc:Choice xmlns:v="urn:schemas-microsoft-com:vml" Requires="v">
-                <p:oleObj spid="_x0000_s93296" name="Equation" r:id="rId7" imgW="888614" imgH="355446" progId="Equation.DSMT4">
+                <p:oleObj name="Equation" r:id="rId6" imgW="888614" imgH="355446" progId="Equation.DSMT4">
                   <p:embed/>
                 </p:oleObj>
               </mc:Choice>
               <mc:Fallback>
-                <p:oleObj name="Equation" r:id="rId7" imgW="888614" imgH="355446" progId="Equation.DSMT4">
+                <p:oleObj name="Equation" r:id="rId6" imgW="888614" imgH="355446" progId="Equation.DSMT4">
                   <p:embed/>
                   <p:pic>
                     <p:nvPicPr>
@@ -31372,7 +31354,7 @@
                       <p:nvPr/>
                     </p:nvPicPr>
                     <p:blipFill>
-                      <a:blip r:embed="rId8">
+                      <a:blip r:embed="rId7">
                         <a:extLst>
                           <a:ext uri="{28A0092B-C50C-407E-A947-70E740481C1C}">
                             <a14:useLocalDpi xmlns:a14="http://schemas.microsoft.com/office/drawing/2010/main" val="0"/>
@@ -31396,7 +31378,6 @@
                       <a:ln>
                         <a:noFill/>
                       </a:ln>
-                      <a:extLst/>
                     </p:spPr>
                   </p:pic>
                 </p:oleObj>
@@ -31591,12 +31572,12 @@
           <a:graphicData uri="http://schemas.openxmlformats.org/presentationml/2006/ole">
             <mc:AlternateContent xmlns:mc="http://schemas.openxmlformats.org/markup-compatibility/2006">
               <mc:Choice xmlns:v="urn:schemas-microsoft-com:vml" Requires="v">
-                <p:oleObj spid="_x0000_s93297" name="Equation" r:id="rId9" imgW="2222280" imgH="736560" progId="Equation.DSMT4">
+                <p:oleObj name="Equation" r:id="rId8" imgW="2222280" imgH="736560" progId="Equation.DSMT4">
                   <p:embed/>
                 </p:oleObj>
               </mc:Choice>
               <mc:Fallback>
-                <p:oleObj name="Equation" r:id="rId9" imgW="2222280" imgH="736560" progId="Equation.DSMT4">
+                <p:oleObj name="Equation" r:id="rId8" imgW="2222280" imgH="736560" progId="Equation.DSMT4">
                   <p:embed/>
                   <p:pic>
                     <p:nvPicPr>
@@ -31607,7 +31588,7 @@
                       <p:nvPr/>
                     </p:nvPicPr>
                     <p:blipFill>
-                      <a:blip r:embed="rId10"/>
+                      <a:blip r:embed="rId9"/>
                       <a:srcRect/>
                       <a:stretch>
                         <a:fillRect/>
@@ -31626,7 +31607,6 @@
                         <a:noFill/>
                       </a:ln>
                       <a:effectLst/>
-                      <a:extLst/>
                     </p:spPr>
                   </p:pic>
                 </p:oleObj>
@@ -31811,9 +31791,7 @@
           <p:cNvGraphicFramePr>
             <a:graphicFrameLocks noChangeAspect="1"/>
           </p:cNvGraphicFramePr>
-          <p:nvPr>
-            <p:extLst/>
-          </p:nvPr>
+          <p:nvPr/>
         </p:nvGraphicFramePr>
         <p:xfrm>
           <a:off x="3627438" y="3695387"/>
@@ -31823,12 +31801,12 @@
           <a:graphicData uri="http://schemas.openxmlformats.org/presentationml/2006/ole">
             <mc:AlternateContent xmlns:mc="http://schemas.openxmlformats.org/markup-compatibility/2006">
               <mc:Choice xmlns:v="urn:schemas-microsoft-com:vml" Requires="v">
-                <p:oleObj spid="_x0000_s93298" name="Equation" r:id="rId11" imgW="5105160" imgH="736560" progId="Equation.DSMT4">
+                <p:oleObj name="Equation" r:id="rId10" imgW="5105160" imgH="736560" progId="Equation.DSMT4">
                   <p:embed/>
                 </p:oleObj>
               </mc:Choice>
               <mc:Fallback>
-                <p:oleObj name="Equation" r:id="rId11" imgW="5105160" imgH="736560" progId="Equation.DSMT4">
+                <p:oleObj name="Equation" r:id="rId10" imgW="5105160" imgH="736560" progId="Equation.DSMT4">
                   <p:embed/>
                   <p:pic>
                     <p:nvPicPr>
@@ -31839,7 +31817,7 @@
                       <p:nvPr/>
                     </p:nvPicPr>
                     <p:blipFill>
-                      <a:blip r:embed="rId12"/>
+                      <a:blip r:embed="rId11"/>
                       <a:srcRect/>
                       <a:stretch>
                         <a:fillRect/>
@@ -31916,12 +31894,12 @@
           <a:graphicData uri="http://schemas.openxmlformats.org/presentationml/2006/ole">
             <mc:AlternateContent xmlns:mc="http://schemas.openxmlformats.org/markup-compatibility/2006">
               <mc:Choice xmlns:v="urn:schemas-microsoft-com:vml" Requires="v">
-                <p:oleObj spid="_x0000_s93299" name="Equation" r:id="rId13" imgW="2679480" imgH="736560" progId="Equation.DSMT4">
+                <p:oleObj name="Equation" r:id="rId12" imgW="2679480" imgH="736560" progId="Equation.DSMT4">
                   <p:embed/>
                 </p:oleObj>
               </mc:Choice>
               <mc:Fallback>
-                <p:oleObj name="Equation" r:id="rId13" imgW="2679480" imgH="736560" progId="Equation.DSMT4">
+                <p:oleObj name="Equation" r:id="rId12" imgW="2679480" imgH="736560" progId="Equation.DSMT4">
                   <p:embed/>
                   <p:pic>
                     <p:nvPicPr>
@@ -31930,7 +31908,7 @@
                       <p:nvPr/>
                     </p:nvPicPr>
                     <p:blipFill>
-                      <a:blip r:embed="rId14"/>
+                      <a:blip r:embed="rId13"/>
                       <a:stretch>
                         <a:fillRect/>
                       </a:stretch>
@@ -32650,9 +32628,7 @@
           <p:cNvGraphicFramePr>
             <a:graphicFrameLocks noChangeAspect="1"/>
           </p:cNvGraphicFramePr>
-          <p:nvPr>
-            <p:extLst/>
-          </p:nvPr>
+          <p:nvPr/>
         </p:nvGraphicFramePr>
         <p:xfrm>
           <a:off x="2351584" y="949172"/>
@@ -32662,12 +32638,12 @@
           <a:graphicData uri="http://schemas.openxmlformats.org/presentationml/2006/ole">
             <mc:AlternateContent xmlns:mc="http://schemas.openxmlformats.org/markup-compatibility/2006">
               <mc:Choice xmlns:v="urn:schemas-microsoft-com:vml" Requires="v">
-                <p:oleObj spid="_x0000_s94318" name="Equation" r:id="rId3" imgW="5486400" imgH="1549080" progId="Equation.DSMT4">
+                <p:oleObj name="Equation" r:id="rId2" imgW="5486400" imgH="1549080" progId="Equation.DSMT4">
                   <p:embed/>
                 </p:oleObj>
               </mc:Choice>
               <mc:Fallback>
-                <p:oleObj name="Equation" r:id="rId3" imgW="5486400" imgH="1549080" progId="Equation.DSMT4">
+                <p:oleObj name="Equation" r:id="rId2" imgW="5486400" imgH="1549080" progId="Equation.DSMT4">
                   <p:embed/>
                   <p:pic>
                     <p:nvPicPr>
@@ -32678,7 +32654,7 @@
                       <p:nvPr/>
                     </p:nvPicPr>
                     <p:blipFill>
-                      <a:blip r:embed="rId4"/>
+                      <a:blip r:embed="rId3"/>
                       <a:srcRect/>
                       <a:stretch>
                         <a:fillRect/>
@@ -32893,9 +32869,7 @@
           <p:cNvGraphicFramePr>
             <a:graphicFrameLocks noChangeAspect="1"/>
           </p:cNvGraphicFramePr>
-          <p:nvPr>
-            <p:extLst/>
-          </p:nvPr>
+          <p:nvPr/>
         </p:nvGraphicFramePr>
         <p:xfrm>
           <a:off x="6602413" y="2577734"/>
@@ -32905,12 +32879,12 @@
           <a:graphicData uri="http://schemas.openxmlformats.org/presentationml/2006/ole">
             <mc:AlternateContent xmlns:mc="http://schemas.openxmlformats.org/markup-compatibility/2006">
               <mc:Choice xmlns:v="urn:schemas-microsoft-com:vml" Requires="v">
-                <p:oleObj spid="_x0000_s94319" name="Equation" r:id="rId5" imgW="3162240" imgH="736560" progId="Equation.DSMT4">
+                <p:oleObj name="Equation" r:id="rId4" imgW="3162240" imgH="736560" progId="Equation.DSMT4">
                   <p:embed/>
                 </p:oleObj>
               </mc:Choice>
               <mc:Fallback>
-                <p:oleObj name="Equation" r:id="rId5" imgW="3162240" imgH="736560" progId="Equation.DSMT4">
+                <p:oleObj name="Equation" r:id="rId4" imgW="3162240" imgH="736560" progId="Equation.DSMT4">
                   <p:embed/>
                   <p:pic>
                     <p:nvPicPr>
@@ -32921,7 +32895,7 @@
                       <p:nvPr/>
                     </p:nvPicPr>
                     <p:blipFill>
-                      <a:blip r:embed="rId6"/>
+                      <a:blip r:embed="rId5"/>
                       <a:srcRect/>
                       <a:stretch>
                         <a:fillRect/>
@@ -32982,9 +32956,7 @@
           <p:cNvGraphicFramePr>
             <a:graphicFrameLocks noChangeAspect="1"/>
           </p:cNvGraphicFramePr>
-          <p:nvPr>
-            <p:extLst/>
-          </p:nvPr>
+          <p:nvPr/>
         </p:nvGraphicFramePr>
         <p:xfrm>
           <a:off x="2329703" y="3576852"/>
@@ -32994,12 +32966,12 @@
           <a:graphicData uri="http://schemas.openxmlformats.org/presentationml/2006/ole">
             <mc:AlternateContent xmlns:mc="http://schemas.openxmlformats.org/markup-compatibility/2006">
               <mc:Choice xmlns:v="urn:schemas-microsoft-com:vml" Requires="v">
-                <p:oleObj spid="_x0000_s94320" name="Equation" r:id="rId7" imgW="1155199" imgH="355446" progId="Equation.DSMT4">
+                <p:oleObj name="Equation" r:id="rId6" imgW="1155199" imgH="355446" progId="Equation.DSMT4">
                   <p:embed/>
                 </p:oleObj>
               </mc:Choice>
               <mc:Fallback>
-                <p:oleObj name="Equation" r:id="rId7" imgW="1155199" imgH="355446" progId="Equation.DSMT4">
+                <p:oleObj name="Equation" r:id="rId6" imgW="1155199" imgH="355446" progId="Equation.DSMT4">
                   <p:embed/>
                   <p:pic>
                     <p:nvPicPr>
@@ -33010,7 +32982,7 @@
                       <p:nvPr/>
                     </p:nvPicPr>
                     <p:blipFill>
-                      <a:blip r:embed="rId8">
+                      <a:blip r:embed="rId7">
                         <a:extLst>
                           <a:ext uri="{28A0092B-C50C-407E-A947-70E740481C1C}">
                             <a14:useLocalDpi xmlns:a14="http://schemas.microsoft.com/office/drawing/2010/main" val="0"/>
@@ -33231,9 +33203,7 @@
           <p:cNvGraphicFramePr>
             <a:graphicFrameLocks noChangeAspect="1"/>
           </p:cNvGraphicFramePr>
-          <p:nvPr>
-            <p:extLst/>
-          </p:nvPr>
+          <p:nvPr/>
         </p:nvGraphicFramePr>
         <p:xfrm>
           <a:off x="4578726" y="3387146"/>
@@ -33243,12 +33213,12 @@
           <a:graphicData uri="http://schemas.openxmlformats.org/presentationml/2006/ole">
             <mc:AlternateContent xmlns:mc="http://schemas.openxmlformats.org/markup-compatibility/2006">
               <mc:Choice xmlns:v="urn:schemas-microsoft-com:vml" Requires="v">
-                <p:oleObj spid="_x0000_s94321" name="Equation" r:id="rId9" imgW="3162240" imgH="736560" progId="Equation.DSMT4">
+                <p:oleObj name="Equation" r:id="rId8" imgW="3162240" imgH="736560" progId="Equation.DSMT4">
                   <p:embed/>
                 </p:oleObj>
               </mc:Choice>
               <mc:Fallback>
-                <p:oleObj name="Equation" r:id="rId9" imgW="3162240" imgH="736560" progId="Equation.DSMT4">
+                <p:oleObj name="Equation" r:id="rId8" imgW="3162240" imgH="736560" progId="Equation.DSMT4">
                   <p:embed/>
                   <p:pic>
                     <p:nvPicPr>
@@ -33259,7 +33229,7 @@
                       <p:nvPr/>
                     </p:nvPicPr>
                     <p:blipFill>
-                      <a:blip r:embed="rId10"/>
+                      <a:blip r:embed="rId9"/>
                       <a:srcRect/>
                       <a:stretch>
                         <a:fillRect/>
@@ -33320,9 +33290,7 @@
           <p:cNvGraphicFramePr>
             <a:graphicFrameLocks noChangeAspect="1"/>
           </p:cNvGraphicFramePr>
-          <p:nvPr>
-            <p:extLst/>
-          </p:nvPr>
+          <p:nvPr/>
         </p:nvGraphicFramePr>
         <p:xfrm>
           <a:off x="2626560" y="4328009"/>
@@ -33332,12 +33300,12 @@
           <a:graphicData uri="http://schemas.openxmlformats.org/presentationml/2006/ole">
             <mc:AlternateContent xmlns:mc="http://schemas.openxmlformats.org/markup-compatibility/2006">
               <mc:Choice xmlns:v="urn:schemas-microsoft-com:vml" Requires="v">
-                <p:oleObj spid="_x0000_s94322" name="Equation" r:id="rId11" imgW="7543800" imgH="736560" progId="Equation.DSMT4">
+                <p:oleObj name="Equation" r:id="rId10" imgW="7543800" imgH="736560" progId="Equation.DSMT4">
                   <p:embed/>
                 </p:oleObj>
               </mc:Choice>
               <mc:Fallback>
-                <p:oleObj name="Equation" r:id="rId11" imgW="7543800" imgH="736560" progId="Equation.DSMT4">
+                <p:oleObj name="Equation" r:id="rId10" imgW="7543800" imgH="736560" progId="Equation.DSMT4">
                   <p:embed/>
                   <p:pic>
                     <p:nvPicPr>
@@ -33348,7 +33316,7 @@
                       <p:nvPr/>
                     </p:nvPicPr>
                     <p:blipFill>
-                      <a:blip r:embed="rId12"/>
+                      <a:blip r:embed="rId11"/>
                       <a:srcRect/>
                       <a:stretch>
                         <a:fillRect/>
@@ -33409,9 +33377,7 @@
           <p:cNvGraphicFramePr>
             <a:graphicFrameLocks noChangeAspect="1"/>
           </p:cNvGraphicFramePr>
-          <p:nvPr>
-            <p:extLst/>
-          </p:nvPr>
+          <p:nvPr/>
         </p:nvGraphicFramePr>
         <p:xfrm>
           <a:off x="2613397" y="5210233"/>
@@ -33421,12 +33387,12 @@
           <a:graphicData uri="http://schemas.openxmlformats.org/presentationml/2006/ole">
             <mc:AlternateContent xmlns:mc="http://schemas.openxmlformats.org/markup-compatibility/2006">
               <mc:Choice xmlns:v="urn:schemas-microsoft-com:vml" Requires="v">
-                <p:oleObj spid="_x0000_s94323" name="Equation" r:id="rId13" imgW="4495680" imgH="736560" progId="Equation.DSMT4">
+                <p:oleObj name="Equation" r:id="rId12" imgW="4495680" imgH="736560" progId="Equation.DSMT4">
                   <p:embed/>
                 </p:oleObj>
               </mc:Choice>
               <mc:Fallback>
-                <p:oleObj name="Equation" r:id="rId13" imgW="4495680" imgH="736560" progId="Equation.DSMT4">
+                <p:oleObj name="Equation" r:id="rId12" imgW="4495680" imgH="736560" progId="Equation.DSMT4">
                   <p:embed/>
                   <p:pic>
                     <p:nvPicPr>
@@ -33435,7 +33401,7 @@
                       <p:nvPr/>
                     </p:nvPicPr>
                     <p:blipFill>
-                      <a:blip r:embed="rId14"/>
+                      <a:blip r:embed="rId13"/>
                       <a:stretch>
                         <a:fillRect/>
                       </a:stretch>
@@ -36033,11 +35999,11 @@
               <a:t>並且設計出適當的 </a:t>
             </a:r>
             <a:r>
-              <a:rPr lang="en-US" altLang="zh-TW" sz="2400" dirty="0">
+              <a:rPr lang="en-US" altLang="zh-TW" sz="2400">
                 <a:latin typeface="Times New Roman" panose="02020603050405020304" pitchFamily="18" charset="0"/>
                 <a:cs typeface="Times New Roman" panose="02020603050405020304" pitchFamily="18" charset="0"/>
               </a:rPr>
-              <a:t>matched filer </a:t>
+              <a:t>matched filter </a:t>
             </a:r>
             <a:r>
               <a:rPr lang="zh-TW" altLang="en-US" sz="2400" dirty="0">

</xml_diff>